<commit_message>
calculating dispersive and no dispersive to compare
</commit_message>
<xml_diff>
--- a/Proposal8_dispersiveFDTD/power_dispersion.pptx
+++ b/Proposal8_dispersiveFDTD/power_dispersion.pptx
@@ -6,6 +6,9 @@
   </p:sldMasterIdLst>
   <p:sldIdLst>
     <p:sldId id="256" r:id="rId2"/>
+    <p:sldId id="257" r:id="rId3"/>
+    <p:sldId id="258" r:id="rId4"/>
+    <p:sldId id="259" r:id="rId5"/>
   </p:sldIdLst>
   <p:sldSz cx="12192000" cy="6858000"/>
   <p:notesSz cx="6858000" cy="9144000"/>
@@ -106,7 +109,7 @@
   </p:defaultTextStyle>
   <p:extLst>
     <p:ext uri="{EFAFB233-063F-42B5-8137-9DF3F51BA10A}">
-      <p15:sldGuideLst xmlns="" xmlns:p15="http://schemas.microsoft.com/office/powerpoint/2012/main">
+      <p15:sldGuideLst xmlns:p15="http://schemas.microsoft.com/office/powerpoint/2012/main" xmlns="">
         <p15:guide id="1" orient="horz" pos="2160" userDrawn="1">
           <p15:clr>
             <a:srgbClr val="A4A3A4"/>
@@ -145,7 +148,7 @@
           <p:cNvPr id="2" name="Título 1">
             <a:extLst>
               <a:ext uri="{FF2B5EF4-FFF2-40B4-BE49-F238E27FC236}">
-                <a16:creationId xmlns="" xmlns:a16="http://schemas.microsoft.com/office/drawing/2014/main" id="{9A8C2D6A-64CB-45BD-B93A-358EA234FD06}"/>
+                <a16:creationId xmlns:a16="http://schemas.microsoft.com/office/drawing/2014/main" xmlns="" id="{9A8C2D6A-64CB-45BD-B93A-358EA234FD06}"/>
               </a:ext>
             </a:extLst>
           </p:cNvPr>
@@ -182,7 +185,7 @@
           <p:cNvPr id="3" name="Subtítulo 2">
             <a:extLst>
               <a:ext uri="{FF2B5EF4-FFF2-40B4-BE49-F238E27FC236}">
-                <a16:creationId xmlns="" xmlns:a16="http://schemas.microsoft.com/office/drawing/2014/main" id="{BD6CB6E4-0764-4353-B2EC-F2BC9AF066B8}"/>
+                <a16:creationId xmlns:a16="http://schemas.microsoft.com/office/drawing/2014/main" xmlns="" id="{BD6CB6E4-0764-4353-B2EC-F2BC9AF066B8}"/>
               </a:ext>
             </a:extLst>
           </p:cNvPr>
@@ -252,7 +255,7 @@
           <p:cNvPr id="4" name="Marcador de fecha 3">
             <a:extLst>
               <a:ext uri="{FF2B5EF4-FFF2-40B4-BE49-F238E27FC236}">
-                <a16:creationId xmlns="" xmlns:a16="http://schemas.microsoft.com/office/drawing/2014/main" id="{0F8CAC8A-213F-40B6-80D1-7C5793C809E0}"/>
+                <a16:creationId xmlns:a16="http://schemas.microsoft.com/office/drawing/2014/main" xmlns="" id="{0F8CAC8A-213F-40B6-80D1-7C5793C809E0}"/>
               </a:ext>
             </a:extLst>
           </p:cNvPr>
@@ -271,7 +274,7 @@
             <a:fld id="{78764E5D-33CF-411D-8190-6505647B94A7}" type="datetimeFigureOut">
               <a:rPr lang="es-ES" smtClean="0"/>
               <a:pPr/>
-              <a:t>09/05/2020</a:t>
+              <a:t>10/05/2020</a:t>
             </a:fld>
             <a:endParaRPr lang="es-ES"/>
           </a:p>
@@ -282,7 +285,7 @@
           <p:cNvPr id="5" name="Marcador de pie de página 4">
             <a:extLst>
               <a:ext uri="{FF2B5EF4-FFF2-40B4-BE49-F238E27FC236}">
-                <a16:creationId xmlns="" xmlns:a16="http://schemas.microsoft.com/office/drawing/2014/main" id="{DFACFDFC-D912-4BC4-83DC-15BA5A9801D5}"/>
+                <a16:creationId xmlns:a16="http://schemas.microsoft.com/office/drawing/2014/main" xmlns="" id="{DFACFDFC-D912-4BC4-83DC-15BA5A9801D5}"/>
               </a:ext>
             </a:extLst>
           </p:cNvPr>
@@ -307,7 +310,7 @@
           <p:cNvPr id="6" name="Marcador de número de diapositiva 5">
             <a:extLst>
               <a:ext uri="{FF2B5EF4-FFF2-40B4-BE49-F238E27FC236}">
-                <a16:creationId xmlns="" xmlns:a16="http://schemas.microsoft.com/office/drawing/2014/main" id="{F6464764-9F2B-44AB-840A-EDD58C0B49AB}"/>
+                <a16:creationId xmlns:a16="http://schemas.microsoft.com/office/drawing/2014/main" xmlns="" id="{F6464764-9F2B-44AB-840A-EDD58C0B49AB}"/>
               </a:ext>
             </a:extLst>
           </p:cNvPr>
@@ -335,7 +338,7 @@
     </p:spTree>
     <p:extLst>
       <p:ext uri="{BB962C8B-B14F-4D97-AF65-F5344CB8AC3E}">
-        <p14:creationId xmlns="" xmlns:p14="http://schemas.microsoft.com/office/powerpoint/2010/main" val="1725802187"/>
+        <p14:creationId xmlns:p14="http://schemas.microsoft.com/office/powerpoint/2010/main" xmlns="" val="1725802187"/>
       </p:ext>
     </p:extLst>
   </p:cSld>
@@ -367,7 +370,7 @@
           <p:cNvPr id="2" name="Título 1">
             <a:extLst>
               <a:ext uri="{FF2B5EF4-FFF2-40B4-BE49-F238E27FC236}">
-                <a16:creationId xmlns="" xmlns:a16="http://schemas.microsoft.com/office/drawing/2014/main" id="{F930F903-D883-49A8-89FB-39263153724D}"/>
+                <a16:creationId xmlns:a16="http://schemas.microsoft.com/office/drawing/2014/main" xmlns="" id="{F930F903-D883-49A8-89FB-39263153724D}"/>
               </a:ext>
             </a:extLst>
           </p:cNvPr>
@@ -395,7 +398,7 @@
           <p:cNvPr id="3" name="Marcador de texto vertical 2">
             <a:extLst>
               <a:ext uri="{FF2B5EF4-FFF2-40B4-BE49-F238E27FC236}">
-                <a16:creationId xmlns="" xmlns:a16="http://schemas.microsoft.com/office/drawing/2014/main" id="{BD233A93-A2EE-49F1-A185-AE4FDB33320C}"/>
+                <a16:creationId xmlns:a16="http://schemas.microsoft.com/office/drawing/2014/main" xmlns="" id="{BD233A93-A2EE-49F1-A185-AE4FDB33320C}"/>
               </a:ext>
             </a:extLst>
           </p:cNvPr>
@@ -452,7 +455,7 @@
           <p:cNvPr id="4" name="Marcador de fecha 3">
             <a:extLst>
               <a:ext uri="{FF2B5EF4-FFF2-40B4-BE49-F238E27FC236}">
-                <a16:creationId xmlns="" xmlns:a16="http://schemas.microsoft.com/office/drawing/2014/main" id="{C136A7AC-8137-4882-BB0D-D54CAF797117}"/>
+                <a16:creationId xmlns:a16="http://schemas.microsoft.com/office/drawing/2014/main" xmlns="" id="{C136A7AC-8137-4882-BB0D-D54CAF797117}"/>
               </a:ext>
             </a:extLst>
           </p:cNvPr>
@@ -471,7 +474,7 @@
             <a:fld id="{78764E5D-33CF-411D-8190-6505647B94A7}" type="datetimeFigureOut">
               <a:rPr lang="es-ES" smtClean="0"/>
               <a:pPr/>
-              <a:t>09/05/2020</a:t>
+              <a:t>10/05/2020</a:t>
             </a:fld>
             <a:endParaRPr lang="es-ES"/>
           </a:p>
@@ -482,7 +485,7 @@
           <p:cNvPr id="5" name="Marcador de pie de página 4">
             <a:extLst>
               <a:ext uri="{FF2B5EF4-FFF2-40B4-BE49-F238E27FC236}">
-                <a16:creationId xmlns="" xmlns:a16="http://schemas.microsoft.com/office/drawing/2014/main" id="{73C86D41-EA0B-429E-97FA-597C917022C6}"/>
+                <a16:creationId xmlns:a16="http://schemas.microsoft.com/office/drawing/2014/main" xmlns="" id="{73C86D41-EA0B-429E-97FA-597C917022C6}"/>
               </a:ext>
             </a:extLst>
           </p:cNvPr>
@@ -507,7 +510,7 @@
           <p:cNvPr id="6" name="Marcador de número de diapositiva 5">
             <a:extLst>
               <a:ext uri="{FF2B5EF4-FFF2-40B4-BE49-F238E27FC236}">
-                <a16:creationId xmlns="" xmlns:a16="http://schemas.microsoft.com/office/drawing/2014/main" id="{8B9B10C8-C21C-476F-A2B9-EC8DABF00CA6}"/>
+                <a16:creationId xmlns:a16="http://schemas.microsoft.com/office/drawing/2014/main" xmlns="" id="{8B9B10C8-C21C-476F-A2B9-EC8DABF00CA6}"/>
               </a:ext>
             </a:extLst>
           </p:cNvPr>
@@ -535,7 +538,7 @@
     </p:spTree>
     <p:extLst>
       <p:ext uri="{BB962C8B-B14F-4D97-AF65-F5344CB8AC3E}">
-        <p14:creationId xmlns="" xmlns:p14="http://schemas.microsoft.com/office/powerpoint/2010/main" val="1734354198"/>
+        <p14:creationId xmlns:p14="http://schemas.microsoft.com/office/powerpoint/2010/main" xmlns="" val="1734354198"/>
       </p:ext>
     </p:extLst>
   </p:cSld>
@@ -567,7 +570,7 @@
           <p:cNvPr id="2" name="Título vertical 1">
             <a:extLst>
               <a:ext uri="{FF2B5EF4-FFF2-40B4-BE49-F238E27FC236}">
-                <a16:creationId xmlns="" xmlns:a16="http://schemas.microsoft.com/office/drawing/2014/main" id="{785E5C82-3328-4C0A-8D79-AAD896037612}"/>
+                <a16:creationId xmlns:a16="http://schemas.microsoft.com/office/drawing/2014/main" xmlns="" id="{785E5C82-3328-4C0A-8D79-AAD896037612}"/>
               </a:ext>
             </a:extLst>
           </p:cNvPr>
@@ -600,7 +603,7 @@
           <p:cNvPr id="3" name="Marcador de texto vertical 2">
             <a:extLst>
               <a:ext uri="{FF2B5EF4-FFF2-40B4-BE49-F238E27FC236}">
-                <a16:creationId xmlns="" xmlns:a16="http://schemas.microsoft.com/office/drawing/2014/main" id="{245D2F6D-7B3B-4D73-99A2-4A1436CAAF6D}"/>
+                <a16:creationId xmlns:a16="http://schemas.microsoft.com/office/drawing/2014/main" xmlns="" id="{245D2F6D-7B3B-4D73-99A2-4A1436CAAF6D}"/>
               </a:ext>
             </a:extLst>
           </p:cNvPr>
@@ -662,7 +665,7 @@
           <p:cNvPr id="4" name="Marcador de fecha 3">
             <a:extLst>
               <a:ext uri="{FF2B5EF4-FFF2-40B4-BE49-F238E27FC236}">
-                <a16:creationId xmlns="" xmlns:a16="http://schemas.microsoft.com/office/drawing/2014/main" id="{453752D4-287D-4B91-89AC-5920152F7854}"/>
+                <a16:creationId xmlns:a16="http://schemas.microsoft.com/office/drawing/2014/main" xmlns="" id="{453752D4-287D-4B91-89AC-5920152F7854}"/>
               </a:ext>
             </a:extLst>
           </p:cNvPr>
@@ -681,7 +684,7 @@
             <a:fld id="{78764E5D-33CF-411D-8190-6505647B94A7}" type="datetimeFigureOut">
               <a:rPr lang="es-ES" smtClean="0"/>
               <a:pPr/>
-              <a:t>09/05/2020</a:t>
+              <a:t>10/05/2020</a:t>
             </a:fld>
             <a:endParaRPr lang="es-ES"/>
           </a:p>
@@ -692,7 +695,7 @@
           <p:cNvPr id="5" name="Marcador de pie de página 4">
             <a:extLst>
               <a:ext uri="{FF2B5EF4-FFF2-40B4-BE49-F238E27FC236}">
-                <a16:creationId xmlns="" xmlns:a16="http://schemas.microsoft.com/office/drawing/2014/main" id="{6D7E85EF-FC14-41C0-B6B1-3DD09F20BCE3}"/>
+                <a16:creationId xmlns:a16="http://schemas.microsoft.com/office/drawing/2014/main" xmlns="" id="{6D7E85EF-FC14-41C0-B6B1-3DD09F20BCE3}"/>
               </a:ext>
             </a:extLst>
           </p:cNvPr>
@@ -717,7 +720,7 @@
           <p:cNvPr id="6" name="Marcador de número de diapositiva 5">
             <a:extLst>
               <a:ext uri="{FF2B5EF4-FFF2-40B4-BE49-F238E27FC236}">
-                <a16:creationId xmlns="" xmlns:a16="http://schemas.microsoft.com/office/drawing/2014/main" id="{DDA2DB14-93B6-46C4-8694-F201D3369102}"/>
+                <a16:creationId xmlns:a16="http://schemas.microsoft.com/office/drawing/2014/main" xmlns="" id="{DDA2DB14-93B6-46C4-8694-F201D3369102}"/>
               </a:ext>
             </a:extLst>
           </p:cNvPr>
@@ -745,7 +748,7 @@
     </p:spTree>
     <p:extLst>
       <p:ext uri="{BB962C8B-B14F-4D97-AF65-F5344CB8AC3E}">
-        <p14:creationId xmlns="" xmlns:p14="http://schemas.microsoft.com/office/powerpoint/2010/main" val="2658485516"/>
+        <p14:creationId xmlns:p14="http://schemas.microsoft.com/office/powerpoint/2010/main" xmlns="" val="2658485516"/>
       </p:ext>
     </p:extLst>
   </p:cSld>
@@ -777,7 +780,7 @@
           <p:cNvPr id="2" name="Título 1">
             <a:extLst>
               <a:ext uri="{FF2B5EF4-FFF2-40B4-BE49-F238E27FC236}">
-                <a16:creationId xmlns="" xmlns:a16="http://schemas.microsoft.com/office/drawing/2014/main" id="{EA7210A1-0852-4C4E-A5D6-3B117A9BCE86}"/>
+                <a16:creationId xmlns:a16="http://schemas.microsoft.com/office/drawing/2014/main" xmlns="" id="{EA7210A1-0852-4C4E-A5D6-3B117A9BCE86}"/>
               </a:ext>
             </a:extLst>
           </p:cNvPr>
@@ -805,7 +808,7 @@
           <p:cNvPr id="3" name="Marcador de contenido 2">
             <a:extLst>
               <a:ext uri="{FF2B5EF4-FFF2-40B4-BE49-F238E27FC236}">
-                <a16:creationId xmlns="" xmlns:a16="http://schemas.microsoft.com/office/drawing/2014/main" id="{F0AF8930-E610-489E-B8BD-7668D84A166A}"/>
+                <a16:creationId xmlns:a16="http://schemas.microsoft.com/office/drawing/2014/main" xmlns="" id="{F0AF8930-E610-489E-B8BD-7668D84A166A}"/>
               </a:ext>
             </a:extLst>
           </p:cNvPr>
@@ -862,7 +865,7 @@
           <p:cNvPr id="4" name="Marcador de fecha 3">
             <a:extLst>
               <a:ext uri="{FF2B5EF4-FFF2-40B4-BE49-F238E27FC236}">
-                <a16:creationId xmlns="" xmlns:a16="http://schemas.microsoft.com/office/drawing/2014/main" id="{74773B68-6DE4-4B58-A2B9-953897783618}"/>
+                <a16:creationId xmlns:a16="http://schemas.microsoft.com/office/drawing/2014/main" xmlns="" id="{74773B68-6DE4-4B58-A2B9-953897783618}"/>
               </a:ext>
             </a:extLst>
           </p:cNvPr>
@@ -881,7 +884,7 @@
             <a:fld id="{78764E5D-33CF-411D-8190-6505647B94A7}" type="datetimeFigureOut">
               <a:rPr lang="es-ES" smtClean="0"/>
               <a:pPr/>
-              <a:t>09/05/2020</a:t>
+              <a:t>10/05/2020</a:t>
             </a:fld>
             <a:endParaRPr lang="es-ES"/>
           </a:p>
@@ -892,7 +895,7 @@
           <p:cNvPr id="5" name="Marcador de pie de página 4">
             <a:extLst>
               <a:ext uri="{FF2B5EF4-FFF2-40B4-BE49-F238E27FC236}">
-                <a16:creationId xmlns="" xmlns:a16="http://schemas.microsoft.com/office/drawing/2014/main" id="{BA8EFF80-282A-4DCA-970A-7B8F5EA79985}"/>
+                <a16:creationId xmlns:a16="http://schemas.microsoft.com/office/drawing/2014/main" xmlns="" id="{BA8EFF80-282A-4DCA-970A-7B8F5EA79985}"/>
               </a:ext>
             </a:extLst>
           </p:cNvPr>
@@ -917,7 +920,7 @@
           <p:cNvPr id="6" name="Marcador de número de diapositiva 5">
             <a:extLst>
               <a:ext uri="{FF2B5EF4-FFF2-40B4-BE49-F238E27FC236}">
-                <a16:creationId xmlns="" xmlns:a16="http://schemas.microsoft.com/office/drawing/2014/main" id="{F34DEC69-63ED-4D2A-9A2F-5F2403757A70}"/>
+                <a16:creationId xmlns:a16="http://schemas.microsoft.com/office/drawing/2014/main" xmlns="" id="{F34DEC69-63ED-4D2A-9A2F-5F2403757A70}"/>
               </a:ext>
             </a:extLst>
           </p:cNvPr>
@@ -945,7 +948,7 @@
     </p:spTree>
     <p:extLst>
       <p:ext uri="{BB962C8B-B14F-4D97-AF65-F5344CB8AC3E}">
-        <p14:creationId xmlns="" xmlns:p14="http://schemas.microsoft.com/office/powerpoint/2010/main" val="1026998829"/>
+        <p14:creationId xmlns:p14="http://schemas.microsoft.com/office/powerpoint/2010/main" xmlns="" val="1026998829"/>
       </p:ext>
     </p:extLst>
   </p:cSld>
@@ -977,7 +980,7 @@
           <p:cNvPr id="2" name="Título 1">
             <a:extLst>
               <a:ext uri="{FF2B5EF4-FFF2-40B4-BE49-F238E27FC236}">
-                <a16:creationId xmlns="" xmlns:a16="http://schemas.microsoft.com/office/drawing/2014/main" id="{6FE6AB59-CE52-4914-BBA1-07D7DC0E818A}"/>
+                <a16:creationId xmlns:a16="http://schemas.microsoft.com/office/drawing/2014/main" xmlns="" id="{6FE6AB59-CE52-4914-BBA1-07D7DC0E818A}"/>
               </a:ext>
             </a:extLst>
           </p:cNvPr>
@@ -1014,7 +1017,7 @@
           <p:cNvPr id="3" name="Marcador de texto 2">
             <a:extLst>
               <a:ext uri="{FF2B5EF4-FFF2-40B4-BE49-F238E27FC236}">
-                <a16:creationId xmlns="" xmlns:a16="http://schemas.microsoft.com/office/drawing/2014/main" id="{86D9FDDA-3B59-4148-9DC8-6B265F70C771}"/>
+                <a16:creationId xmlns:a16="http://schemas.microsoft.com/office/drawing/2014/main" xmlns="" id="{86D9FDDA-3B59-4148-9DC8-6B265F70C771}"/>
               </a:ext>
             </a:extLst>
           </p:cNvPr>
@@ -1139,7 +1142,7 @@
           <p:cNvPr id="4" name="Marcador de fecha 3">
             <a:extLst>
               <a:ext uri="{FF2B5EF4-FFF2-40B4-BE49-F238E27FC236}">
-                <a16:creationId xmlns="" xmlns:a16="http://schemas.microsoft.com/office/drawing/2014/main" id="{7BBDFE2E-38C0-4C9C-B456-B9B2E3DF67E2}"/>
+                <a16:creationId xmlns:a16="http://schemas.microsoft.com/office/drawing/2014/main" xmlns="" id="{7BBDFE2E-38C0-4C9C-B456-B9B2E3DF67E2}"/>
               </a:ext>
             </a:extLst>
           </p:cNvPr>
@@ -1158,7 +1161,7 @@
             <a:fld id="{78764E5D-33CF-411D-8190-6505647B94A7}" type="datetimeFigureOut">
               <a:rPr lang="es-ES" smtClean="0"/>
               <a:pPr/>
-              <a:t>09/05/2020</a:t>
+              <a:t>10/05/2020</a:t>
             </a:fld>
             <a:endParaRPr lang="es-ES"/>
           </a:p>
@@ -1169,7 +1172,7 @@
           <p:cNvPr id="5" name="Marcador de pie de página 4">
             <a:extLst>
               <a:ext uri="{FF2B5EF4-FFF2-40B4-BE49-F238E27FC236}">
-                <a16:creationId xmlns="" xmlns:a16="http://schemas.microsoft.com/office/drawing/2014/main" id="{3C772C1C-3057-4E72-B0CE-0488F3F05595}"/>
+                <a16:creationId xmlns:a16="http://schemas.microsoft.com/office/drawing/2014/main" xmlns="" id="{3C772C1C-3057-4E72-B0CE-0488F3F05595}"/>
               </a:ext>
             </a:extLst>
           </p:cNvPr>
@@ -1194,7 +1197,7 @@
           <p:cNvPr id="6" name="Marcador de número de diapositiva 5">
             <a:extLst>
               <a:ext uri="{FF2B5EF4-FFF2-40B4-BE49-F238E27FC236}">
-                <a16:creationId xmlns="" xmlns:a16="http://schemas.microsoft.com/office/drawing/2014/main" id="{75414A4C-ABE7-4769-B9E4-6F6F1933FC5C}"/>
+                <a16:creationId xmlns:a16="http://schemas.microsoft.com/office/drawing/2014/main" xmlns="" id="{75414A4C-ABE7-4769-B9E4-6F6F1933FC5C}"/>
               </a:ext>
             </a:extLst>
           </p:cNvPr>
@@ -1222,7 +1225,7 @@
     </p:spTree>
     <p:extLst>
       <p:ext uri="{BB962C8B-B14F-4D97-AF65-F5344CB8AC3E}">
-        <p14:creationId xmlns="" xmlns:p14="http://schemas.microsoft.com/office/powerpoint/2010/main" val="34368478"/>
+        <p14:creationId xmlns:p14="http://schemas.microsoft.com/office/powerpoint/2010/main" xmlns="" val="34368478"/>
       </p:ext>
     </p:extLst>
   </p:cSld>
@@ -1254,7 +1257,7 @@
           <p:cNvPr id="2" name="Título 1">
             <a:extLst>
               <a:ext uri="{FF2B5EF4-FFF2-40B4-BE49-F238E27FC236}">
-                <a16:creationId xmlns="" xmlns:a16="http://schemas.microsoft.com/office/drawing/2014/main" id="{44424DEE-8EE9-411F-8013-0D8BCC6A0169}"/>
+                <a16:creationId xmlns:a16="http://schemas.microsoft.com/office/drawing/2014/main" xmlns="" id="{44424DEE-8EE9-411F-8013-0D8BCC6A0169}"/>
               </a:ext>
             </a:extLst>
           </p:cNvPr>
@@ -1282,7 +1285,7 @@
           <p:cNvPr id="3" name="Marcador de contenido 2">
             <a:extLst>
               <a:ext uri="{FF2B5EF4-FFF2-40B4-BE49-F238E27FC236}">
-                <a16:creationId xmlns="" xmlns:a16="http://schemas.microsoft.com/office/drawing/2014/main" id="{D3BA97D0-B54D-4C36-9D8B-8398230F902F}"/>
+                <a16:creationId xmlns:a16="http://schemas.microsoft.com/office/drawing/2014/main" xmlns="" id="{D3BA97D0-B54D-4C36-9D8B-8398230F902F}"/>
               </a:ext>
             </a:extLst>
           </p:cNvPr>
@@ -1344,7 +1347,7 @@
           <p:cNvPr id="4" name="Marcador de contenido 3">
             <a:extLst>
               <a:ext uri="{FF2B5EF4-FFF2-40B4-BE49-F238E27FC236}">
-                <a16:creationId xmlns="" xmlns:a16="http://schemas.microsoft.com/office/drawing/2014/main" id="{A8AAF4A2-7FF8-4847-BBDB-10CAA5772535}"/>
+                <a16:creationId xmlns:a16="http://schemas.microsoft.com/office/drawing/2014/main" xmlns="" id="{A8AAF4A2-7FF8-4847-BBDB-10CAA5772535}"/>
               </a:ext>
             </a:extLst>
           </p:cNvPr>
@@ -1406,7 +1409,7 @@
           <p:cNvPr id="5" name="Marcador de fecha 4">
             <a:extLst>
               <a:ext uri="{FF2B5EF4-FFF2-40B4-BE49-F238E27FC236}">
-                <a16:creationId xmlns="" xmlns:a16="http://schemas.microsoft.com/office/drawing/2014/main" id="{4924A97A-56A4-4721-96E4-8FC50832D0FA}"/>
+                <a16:creationId xmlns:a16="http://schemas.microsoft.com/office/drawing/2014/main" xmlns="" id="{4924A97A-56A4-4721-96E4-8FC50832D0FA}"/>
               </a:ext>
             </a:extLst>
           </p:cNvPr>
@@ -1425,7 +1428,7 @@
             <a:fld id="{78764E5D-33CF-411D-8190-6505647B94A7}" type="datetimeFigureOut">
               <a:rPr lang="es-ES" smtClean="0"/>
               <a:pPr/>
-              <a:t>09/05/2020</a:t>
+              <a:t>10/05/2020</a:t>
             </a:fld>
             <a:endParaRPr lang="es-ES"/>
           </a:p>
@@ -1436,7 +1439,7 @@
           <p:cNvPr id="6" name="Marcador de pie de página 5">
             <a:extLst>
               <a:ext uri="{FF2B5EF4-FFF2-40B4-BE49-F238E27FC236}">
-                <a16:creationId xmlns="" xmlns:a16="http://schemas.microsoft.com/office/drawing/2014/main" id="{F5C68C42-B5DE-4DAA-8993-46A067B6EF87}"/>
+                <a16:creationId xmlns:a16="http://schemas.microsoft.com/office/drawing/2014/main" xmlns="" id="{F5C68C42-B5DE-4DAA-8993-46A067B6EF87}"/>
               </a:ext>
             </a:extLst>
           </p:cNvPr>
@@ -1461,7 +1464,7 @@
           <p:cNvPr id="7" name="Marcador de número de diapositiva 6">
             <a:extLst>
               <a:ext uri="{FF2B5EF4-FFF2-40B4-BE49-F238E27FC236}">
-                <a16:creationId xmlns="" xmlns:a16="http://schemas.microsoft.com/office/drawing/2014/main" id="{464C8AAB-1441-41F7-9528-2A8E27609EEA}"/>
+                <a16:creationId xmlns:a16="http://schemas.microsoft.com/office/drawing/2014/main" xmlns="" id="{464C8AAB-1441-41F7-9528-2A8E27609EEA}"/>
               </a:ext>
             </a:extLst>
           </p:cNvPr>
@@ -1489,7 +1492,7 @@
     </p:spTree>
     <p:extLst>
       <p:ext uri="{BB962C8B-B14F-4D97-AF65-F5344CB8AC3E}">
-        <p14:creationId xmlns="" xmlns:p14="http://schemas.microsoft.com/office/powerpoint/2010/main" val="2587349956"/>
+        <p14:creationId xmlns:p14="http://schemas.microsoft.com/office/powerpoint/2010/main" xmlns="" val="2587349956"/>
       </p:ext>
     </p:extLst>
   </p:cSld>
@@ -1521,7 +1524,7 @@
           <p:cNvPr id="2" name="Título 1">
             <a:extLst>
               <a:ext uri="{FF2B5EF4-FFF2-40B4-BE49-F238E27FC236}">
-                <a16:creationId xmlns="" xmlns:a16="http://schemas.microsoft.com/office/drawing/2014/main" id="{49D99ACC-FB28-4393-BDEF-ECEFEB2E8947}"/>
+                <a16:creationId xmlns:a16="http://schemas.microsoft.com/office/drawing/2014/main" xmlns="" id="{49D99ACC-FB28-4393-BDEF-ECEFEB2E8947}"/>
               </a:ext>
             </a:extLst>
           </p:cNvPr>
@@ -1554,7 +1557,7 @@
           <p:cNvPr id="3" name="Marcador de texto 2">
             <a:extLst>
               <a:ext uri="{FF2B5EF4-FFF2-40B4-BE49-F238E27FC236}">
-                <a16:creationId xmlns="" xmlns:a16="http://schemas.microsoft.com/office/drawing/2014/main" id="{4D473133-C61E-494E-BD7B-FF9673038370}"/>
+                <a16:creationId xmlns:a16="http://schemas.microsoft.com/office/drawing/2014/main" xmlns="" id="{4D473133-C61E-494E-BD7B-FF9673038370}"/>
               </a:ext>
             </a:extLst>
           </p:cNvPr>
@@ -1625,7 +1628,7 @@
           <p:cNvPr id="4" name="Marcador de contenido 3">
             <a:extLst>
               <a:ext uri="{FF2B5EF4-FFF2-40B4-BE49-F238E27FC236}">
-                <a16:creationId xmlns="" xmlns:a16="http://schemas.microsoft.com/office/drawing/2014/main" id="{830FBE9B-25C5-45EF-92AE-6CDBEB7932C1}"/>
+                <a16:creationId xmlns:a16="http://schemas.microsoft.com/office/drawing/2014/main" xmlns="" id="{830FBE9B-25C5-45EF-92AE-6CDBEB7932C1}"/>
               </a:ext>
             </a:extLst>
           </p:cNvPr>
@@ -1687,7 +1690,7 @@
           <p:cNvPr id="5" name="Marcador de texto 4">
             <a:extLst>
               <a:ext uri="{FF2B5EF4-FFF2-40B4-BE49-F238E27FC236}">
-                <a16:creationId xmlns="" xmlns:a16="http://schemas.microsoft.com/office/drawing/2014/main" id="{6D9C824F-4443-4996-96FA-984092E4EAB0}"/>
+                <a16:creationId xmlns:a16="http://schemas.microsoft.com/office/drawing/2014/main" xmlns="" id="{6D9C824F-4443-4996-96FA-984092E4EAB0}"/>
               </a:ext>
             </a:extLst>
           </p:cNvPr>
@@ -1758,7 +1761,7 @@
           <p:cNvPr id="6" name="Marcador de contenido 5">
             <a:extLst>
               <a:ext uri="{FF2B5EF4-FFF2-40B4-BE49-F238E27FC236}">
-                <a16:creationId xmlns="" xmlns:a16="http://schemas.microsoft.com/office/drawing/2014/main" id="{7B34CBCF-4A79-44BF-9F00-DB5F03D4E79E}"/>
+                <a16:creationId xmlns:a16="http://schemas.microsoft.com/office/drawing/2014/main" xmlns="" id="{7B34CBCF-4A79-44BF-9F00-DB5F03D4E79E}"/>
               </a:ext>
             </a:extLst>
           </p:cNvPr>
@@ -1820,7 +1823,7 @@
           <p:cNvPr id="7" name="Marcador de fecha 6">
             <a:extLst>
               <a:ext uri="{FF2B5EF4-FFF2-40B4-BE49-F238E27FC236}">
-                <a16:creationId xmlns="" xmlns:a16="http://schemas.microsoft.com/office/drawing/2014/main" id="{4371C391-8585-49D7-8207-1872FBEAE992}"/>
+                <a16:creationId xmlns:a16="http://schemas.microsoft.com/office/drawing/2014/main" xmlns="" id="{4371C391-8585-49D7-8207-1872FBEAE992}"/>
               </a:ext>
             </a:extLst>
           </p:cNvPr>
@@ -1839,7 +1842,7 @@
             <a:fld id="{78764E5D-33CF-411D-8190-6505647B94A7}" type="datetimeFigureOut">
               <a:rPr lang="es-ES" smtClean="0"/>
               <a:pPr/>
-              <a:t>09/05/2020</a:t>
+              <a:t>10/05/2020</a:t>
             </a:fld>
             <a:endParaRPr lang="es-ES"/>
           </a:p>
@@ -1850,7 +1853,7 @@
           <p:cNvPr id="8" name="Marcador de pie de página 7">
             <a:extLst>
               <a:ext uri="{FF2B5EF4-FFF2-40B4-BE49-F238E27FC236}">
-                <a16:creationId xmlns="" xmlns:a16="http://schemas.microsoft.com/office/drawing/2014/main" id="{1A09D416-4D5E-4259-9F5F-976E21E668A1}"/>
+                <a16:creationId xmlns:a16="http://schemas.microsoft.com/office/drawing/2014/main" xmlns="" id="{1A09D416-4D5E-4259-9F5F-976E21E668A1}"/>
               </a:ext>
             </a:extLst>
           </p:cNvPr>
@@ -1875,7 +1878,7 @@
           <p:cNvPr id="9" name="Marcador de número de diapositiva 8">
             <a:extLst>
               <a:ext uri="{FF2B5EF4-FFF2-40B4-BE49-F238E27FC236}">
-                <a16:creationId xmlns="" xmlns:a16="http://schemas.microsoft.com/office/drawing/2014/main" id="{62890C1A-A9E4-4F9A-9E1D-1634C1C801B6}"/>
+                <a16:creationId xmlns:a16="http://schemas.microsoft.com/office/drawing/2014/main" xmlns="" id="{62890C1A-A9E4-4F9A-9E1D-1634C1C801B6}"/>
               </a:ext>
             </a:extLst>
           </p:cNvPr>
@@ -1903,7 +1906,7 @@
     </p:spTree>
     <p:extLst>
       <p:ext uri="{BB962C8B-B14F-4D97-AF65-F5344CB8AC3E}">
-        <p14:creationId xmlns="" xmlns:p14="http://schemas.microsoft.com/office/powerpoint/2010/main" val="3474318126"/>
+        <p14:creationId xmlns:p14="http://schemas.microsoft.com/office/powerpoint/2010/main" xmlns="" val="3474318126"/>
       </p:ext>
     </p:extLst>
   </p:cSld>
@@ -1935,7 +1938,7 @@
           <p:cNvPr id="2" name="Título 1">
             <a:extLst>
               <a:ext uri="{FF2B5EF4-FFF2-40B4-BE49-F238E27FC236}">
-                <a16:creationId xmlns="" xmlns:a16="http://schemas.microsoft.com/office/drawing/2014/main" id="{45B0AB95-CDF8-43FB-9D69-467916C9A27B}"/>
+                <a16:creationId xmlns:a16="http://schemas.microsoft.com/office/drawing/2014/main" xmlns="" id="{45B0AB95-CDF8-43FB-9D69-467916C9A27B}"/>
               </a:ext>
             </a:extLst>
           </p:cNvPr>
@@ -1963,7 +1966,7 @@
           <p:cNvPr id="3" name="Marcador de fecha 2">
             <a:extLst>
               <a:ext uri="{FF2B5EF4-FFF2-40B4-BE49-F238E27FC236}">
-                <a16:creationId xmlns="" xmlns:a16="http://schemas.microsoft.com/office/drawing/2014/main" id="{F54062A4-59F9-48D6-956F-2DB8EE94BD38}"/>
+                <a16:creationId xmlns:a16="http://schemas.microsoft.com/office/drawing/2014/main" xmlns="" id="{F54062A4-59F9-48D6-956F-2DB8EE94BD38}"/>
               </a:ext>
             </a:extLst>
           </p:cNvPr>
@@ -1982,7 +1985,7 @@
             <a:fld id="{78764E5D-33CF-411D-8190-6505647B94A7}" type="datetimeFigureOut">
               <a:rPr lang="es-ES" smtClean="0"/>
               <a:pPr/>
-              <a:t>09/05/2020</a:t>
+              <a:t>10/05/2020</a:t>
             </a:fld>
             <a:endParaRPr lang="es-ES"/>
           </a:p>
@@ -1993,7 +1996,7 @@
           <p:cNvPr id="4" name="Marcador de pie de página 3">
             <a:extLst>
               <a:ext uri="{FF2B5EF4-FFF2-40B4-BE49-F238E27FC236}">
-                <a16:creationId xmlns="" xmlns:a16="http://schemas.microsoft.com/office/drawing/2014/main" id="{F845E587-AD02-4F65-A2D0-55E1F90921F3}"/>
+                <a16:creationId xmlns:a16="http://schemas.microsoft.com/office/drawing/2014/main" xmlns="" id="{F845E587-AD02-4F65-A2D0-55E1F90921F3}"/>
               </a:ext>
             </a:extLst>
           </p:cNvPr>
@@ -2018,7 +2021,7 @@
           <p:cNvPr id="5" name="Marcador de número de diapositiva 4">
             <a:extLst>
               <a:ext uri="{FF2B5EF4-FFF2-40B4-BE49-F238E27FC236}">
-                <a16:creationId xmlns="" xmlns:a16="http://schemas.microsoft.com/office/drawing/2014/main" id="{49311382-983E-4A54-B2C6-D5A02539B964}"/>
+                <a16:creationId xmlns:a16="http://schemas.microsoft.com/office/drawing/2014/main" xmlns="" id="{49311382-983E-4A54-B2C6-D5A02539B964}"/>
               </a:ext>
             </a:extLst>
           </p:cNvPr>
@@ -2046,7 +2049,7 @@
     </p:spTree>
     <p:extLst>
       <p:ext uri="{BB962C8B-B14F-4D97-AF65-F5344CB8AC3E}">
-        <p14:creationId xmlns="" xmlns:p14="http://schemas.microsoft.com/office/powerpoint/2010/main" val="715999605"/>
+        <p14:creationId xmlns:p14="http://schemas.microsoft.com/office/powerpoint/2010/main" xmlns="" val="715999605"/>
       </p:ext>
     </p:extLst>
   </p:cSld>
@@ -2078,7 +2081,7 @@
           <p:cNvPr id="2" name="Marcador de fecha 1">
             <a:extLst>
               <a:ext uri="{FF2B5EF4-FFF2-40B4-BE49-F238E27FC236}">
-                <a16:creationId xmlns="" xmlns:a16="http://schemas.microsoft.com/office/drawing/2014/main" id="{6B3A776E-4199-4CF5-8258-BD015DEC23B7}"/>
+                <a16:creationId xmlns:a16="http://schemas.microsoft.com/office/drawing/2014/main" xmlns="" id="{6B3A776E-4199-4CF5-8258-BD015DEC23B7}"/>
               </a:ext>
             </a:extLst>
           </p:cNvPr>
@@ -2097,7 +2100,7 @@
             <a:fld id="{78764E5D-33CF-411D-8190-6505647B94A7}" type="datetimeFigureOut">
               <a:rPr lang="es-ES" smtClean="0"/>
               <a:pPr/>
-              <a:t>09/05/2020</a:t>
+              <a:t>10/05/2020</a:t>
             </a:fld>
             <a:endParaRPr lang="es-ES"/>
           </a:p>
@@ -2108,7 +2111,7 @@
           <p:cNvPr id="3" name="Marcador de pie de página 2">
             <a:extLst>
               <a:ext uri="{FF2B5EF4-FFF2-40B4-BE49-F238E27FC236}">
-                <a16:creationId xmlns="" xmlns:a16="http://schemas.microsoft.com/office/drawing/2014/main" id="{66A203BC-D97D-4642-A684-FBC06480B33E}"/>
+                <a16:creationId xmlns:a16="http://schemas.microsoft.com/office/drawing/2014/main" xmlns="" id="{66A203BC-D97D-4642-A684-FBC06480B33E}"/>
               </a:ext>
             </a:extLst>
           </p:cNvPr>
@@ -2133,7 +2136,7 @@
           <p:cNvPr id="4" name="Marcador de número de diapositiva 3">
             <a:extLst>
               <a:ext uri="{FF2B5EF4-FFF2-40B4-BE49-F238E27FC236}">
-                <a16:creationId xmlns="" xmlns:a16="http://schemas.microsoft.com/office/drawing/2014/main" id="{F40549A1-99E1-4BDE-B74B-AEA847B64BF7}"/>
+                <a16:creationId xmlns:a16="http://schemas.microsoft.com/office/drawing/2014/main" xmlns="" id="{F40549A1-99E1-4BDE-B74B-AEA847B64BF7}"/>
               </a:ext>
             </a:extLst>
           </p:cNvPr>
@@ -2161,7 +2164,7 @@
     </p:spTree>
     <p:extLst>
       <p:ext uri="{BB962C8B-B14F-4D97-AF65-F5344CB8AC3E}">
-        <p14:creationId xmlns="" xmlns:p14="http://schemas.microsoft.com/office/powerpoint/2010/main" val="121284064"/>
+        <p14:creationId xmlns:p14="http://schemas.microsoft.com/office/powerpoint/2010/main" xmlns="" val="121284064"/>
       </p:ext>
     </p:extLst>
   </p:cSld>
@@ -2193,7 +2196,7 @@
           <p:cNvPr id="2" name="Título 1">
             <a:extLst>
               <a:ext uri="{FF2B5EF4-FFF2-40B4-BE49-F238E27FC236}">
-                <a16:creationId xmlns="" xmlns:a16="http://schemas.microsoft.com/office/drawing/2014/main" id="{894A8A20-B9AA-4A52-8FA8-963AB2686DCF}"/>
+                <a16:creationId xmlns:a16="http://schemas.microsoft.com/office/drawing/2014/main" xmlns="" id="{894A8A20-B9AA-4A52-8FA8-963AB2686DCF}"/>
               </a:ext>
             </a:extLst>
           </p:cNvPr>
@@ -2230,7 +2233,7 @@
           <p:cNvPr id="3" name="Marcador de contenido 2">
             <a:extLst>
               <a:ext uri="{FF2B5EF4-FFF2-40B4-BE49-F238E27FC236}">
-                <a16:creationId xmlns="" xmlns:a16="http://schemas.microsoft.com/office/drawing/2014/main" id="{34E4F994-CE03-4504-B86C-69F69B8CA970}"/>
+                <a16:creationId xmlns:a16="http://schemas.microsoft.com/office/drawing/2014/main" xmlns="" id="{34E4F994-CE03-4504-B86C-69F69B8CA970}"/>
               </a:ext>
             </a:extLst>
           </p:cNvPr>
@@ -2320,7 +2323,7 @@
           <p:cNvPr id="4" name="Marcador de texto 3">
             <a:extLst>
               <a:ext uri="{FF2B5EF4-FFF2-40B4-BE49-F238E27FC236}">
-                <a16:creationId xmlns="" xmlns:a16="http://schemas.microsoft.com/office/drawing/2014/main" id="{86B0981E-2D64-48FC-A7E5-BBBB247DEA3E}"/>
+                <a16:creationId xmlns:a16="http://schemas.microsoft.com/office/drawing/2014/main" xmlns="" id="{86B0981E-2D64-48FC-A7E5-BBBB247DEA3E}"/>
               </a:ext>
             </a:extLst>
           </p:cNvPr>
@@ -2391,7 +2394,7 @@
           <p:cNvPr id="5" name="Marcador de fecha 4">
             <a:extLst>
               <a:ext uri="{FF2B5EF4-FFF2-40B4-BE49-F238E27FC236}">
-                <a16:creationId xmlns="" xmlns:a16="http://schemas.microsoft.com/office/drawing/2014/main" id="{E480CF4D-B31D-4C14-9A55-81ECA28D24F0}"/>
+                <a16:creationId xmlns:a16="http://schemas.microsoft.com/office/drawing/2014/main" xmlns="" id="{E480CF4D-B31D-4C14-9A55-81ECA28D24F0}"/>
               </a:ext>
             </a:extLst>
           </p:cNvPr>
@@ -2410,7 +2413,7 @@
             <a:fld id="{78764E5D-33CF-411D-8190-6505647B94A7}" type="datetimeFigureOut">
               <a:rPr lang="es-ES" smtClean="0"/>
               <a:pPr/>
-              <a:t>09/05/2020</a:t>
+              <a:t>10/05/2020</a:t>
             </a:fld>
             <a:endParaRPr lang="es-ES"/>
           </a:p>
@@ -2421,7 +2424,7 @@
           <p:cNvPr id="6" name="Marcador de pie de página 5">
             <a:extLst>
               <a:ext uri="{FF2B5EF4-FFF2-40B4-BE49-F238E27FC236}">
-                <a16:creationId xmlns="" xmlns:a16="http://schemas.microsoft.com/office/drawing/2014/main" id="{0F02A1FF-ADBD-46B1-AF68-22BC547D93E1}"/>
+                <a16:creationId xmlns:a16="http://schemas.microsoft.com/office/drawing/2014/main" xmlns="" id="{0F02A1FF-ADBD-46B1-AF68-22BC547D93E1}"/>
               </a:ext>
             </a:extLst>
           </p:cNvPr>
@@ -2446,7 +2449,7 @@
           <p:cNvPr id="7" name="Marcador de número de diapositiva 6">
             <a:extLst>
               <a:ext uri="{FF2B5EF4-FFF2-40B4-BE49-F238E27FC236}">
-                <a16:creationId xmlns="" xmlns:a16="http://schemas.microsoft.com/office/drawing/2014/main" id="{9A430BE9-D1D6-41FE-ADD3-391A4AA9ECA7}"/>
+                <a16:creationId xmlns:a16="http://schemas.microsoft.com/office/drawing/2014/main" xmlns="" id="{9A430BE9-D1D6-41FE-ADD3-391A4AA9ECA7}"/>
               </a:ext>
             </a:extLst>
           </p:cNvPr>
@@ -2474,7 +2477,7 @@
     </p:spTree>
     <p:extLst>
       <p:ext uri="{BB962C8B-B14F-4D97-AF65-F5344CB8AC3E}">
-        <p14:creationId xmlns="" xmlns:p14="http://schemas.microsoft.com/office/powerpoint/2010/main" val="3190995373"/>
+        <p14:creationId xmlns:p14="http://schemas.microsoft.com/office/powerpoint/2010/main" xmlns="" val="3190995373"/>
       </p:ext>
     </p:extLst>
   </p:cSld>
@@ -2506,7 +2509,7 @@
           <p:cNvPr id="2" name="Título 1">
             <a:extLst>
               <a:ext uri="{FF2B5EF4-FFF2-40B4-BE49-F238E27FC236}">
-                <a16:creationId xmlns="" xmlns:a16="http://schemas.microsoft.com/office/drawing/2014/main" id="{AE7F06AC-B38B-4A06-9E4F-DC07E7346DBE}"/>
+                <a16:creationId xmlns:a16="http://schemas.microsoft.com/office/drawing/2014/main" xmlns="" id="{AE7F06AC-B38B-4A06-9E4F-DC07E7346DBE}"/>
               </a:ext>
             </a:extLst>
           </p:cNvPr>
@@ -2543,7 +2546,7 @@
           <p:cNvPr id="3" name="Marcador de posición de imagen 2">
             <a:extLst>
               <a:ext uri="{FF2B5EF4-FFF2-40B4-BE49-F238E27FC236}">
-                <a16:creationId xmlns="" xmlns:a16="http://schemas.microsoft.com/office/drawing/2014/main" id="{DC806EDC-66ED-4876-8094-980EC99A0B44}"/>
+                <a16:creationId xmlns:a16="http://schemas.microsoft.com/office/drawing/2014/main" xmlns="" id="{DC806EDC-66ED-4876-8094-980EC99A0B44}"/>
               </a:ext>
             </a:extLst>
           </p:cNvPr>
@@ -2610,7 +2613,7 @@
           <p:cNvPr id="4" name="Marcador de texto 3">
             <a:extLst>
               <a:ext uri="{FF2B5EF4-FFF2-40B4-BE49-F238E27FC236}">
-                <a16:creationId xmlns="" xmlns:a16="http://schemas.microsoft.com/office/drawing/2014/main" id="{047CA7CC-2BAF-465C-81BC-6B008F55C09D}"/>
+                <a16:creationId xmlns:a16="http://schemas.microsoft.com/office/drawing/2014/main" xmlns="" id="{047CA7CC-2BAF-465C-81BC-6B008F55C09D}"/>
               </a:ext>
             </a:extLst>
           </p:cNvPr>
@@ -2681,7 +2684,7 @@
           <p:cNvPr id="5" name="Marcador de fecha 4">
             <a:extLst>
               <a:ext uri="{FF2B5EF4-FFF2-40B4-BE49-F238E27FC236}">
-                <a16:creationId xmlns="" xmlns:a16="http://schemas.microsoft.com/office/drawing/2014/main" id="{77152B48-8F0C-435E-BE08-5FB4AE9AB226}"/>
+                <a16:creationId xmlns:a16="http://schemas.microsoft.com/office/drawing/2014/main" xmlns="" id="{77152B48-8F0C-435E-BE08-5FB4AE9AB226}"/>
               </a:ext>
             </a:extLst>
           </p:cNvPr>
@@ -2700,7 +2703,7 @@
             <a:fld id="{78764E5D-33CF-411D-8190-6505647B94A7}" type="datetimeFigureOut">
               <a:rPr lang="es-ES" smtClean="0"/>
               <a:pPr/>
-              <a:t>09/05/2020</a:t>
+              <a:t>10/05/2020</a:t>
             </a:fld>
             <a:endParaRPr lang="es-ES"/>
           </a:p>
@@ -2711,7 +2714,7 @@
           <p:cNvPr id="6" name="Marcador de pie de página 5">
             <a:extLst>
               <a:ext uri="{FF2B5EF4-FFF2-40B4-BE49-F238E27FC236}">
-                <a16:creationId xmlns="" xmlns:a16="http://schemas.microsoft.com/office/drawing/2014/main" id="{C2FF2182-E4F8-4E34-B537-92BA010C7D1E}"/>
+                <a16:creationId xmlns:a16="http://schemas.microsoft.com/office/drawing/2014/main" xmlns="" id="{C2FF2182-E4F8-4E34-B537-92BA010C7D1E}"/>
               </a:ext>
             </a:extLst>
           </p:cNvPr>
@@ -2736,7 +2739,7 @@
           <p:cNvPr id="7" name="Marcador de número de diapositiva 6">
             <a:extLst>
               <a:ext uri="{FF2B5EF4-FFF2-40B4-BE49-F238E27FC236}">
-                <a16:creationId xmlns="" xmlns:a16="http://schemas.microsoft.com/office/drawing/2014/main" id="{F84577BA-43DC-4AE0-94FD-ECCD2023DF74}"/>
+                <a16:creationId xmlns:a16="http://schemas.microsoft.com/office/drawing/2014/main" xmlns="" id="{F84577BA-43DC-4AE0-94FD-ECCD2023DF74}"/>
               </a:ext>
             </a:extLst>
           </p:cNvPr>
@@ -2764,7 +2767,7 @@
     </p:spTree>
     <p:extLst>
       <p:ext uri="{BB962C8B-B14F-4D97-AF65-F5344CB8AC3E}">
-        <p14:creationId xmlns="" xmlns:p14="http://schemas.microsoft.com/office/powerpoint/2010/main" val="1600510695"/>
+        <p14:creationId xmlns:p14="http://schemas.microsoft.com/office/powerpoint/2010/main" xmlns="" val="1600510695"/>
       </p:ext>
     </p:extLst>
   </p:cSld>
@@ -2801,7 +2804,7 @@
           <p:cNvPr id="2" name="Marcador de título 1">
             <a:extLst>
               <a:ext uri="{FF2B5EF4-FFF2-40B4-BE49-F238E27FC236}">
-                <a16:creationId xmlns="" xmlns:a16="http://schemas.microsoft.com/office/drawing/2014/main" id="{06070C5B-D48C-45F5-8D66-86980AE7F7D9}"/>
+                <a16:creationId xmlns:a16="http://schemas.microsoft.com/office/drawing/2014/main" xmlns="" id="{06070C5B-D48C-45F5-8D66-86980AE7F7D9}"/>
               </a:ext>
             </a:extLst>
           </p:cNvPr>
@@ -2839,7 +2842,7 @@
           <p:cNvPr id="3" name="Marcador de texto 2">
             <a:extLst>
               <a:ext uri="{FF2B5EF4-FFF2-40B4-BE49-F238E27FC236}">
-                <a16:creationId xmlns="" xmlns:a16="http://schemas.microsoft.com/office/drawing/2014/main" id="{B888F547-4824-40C5-9FF6-E29A4D94A127}"/>
+                <a16:creationId xmlns:a16="http://schemas.microsoft.com/office/drawing/2014/main" xmlns="" id="{B888F547-4824-40C5-9FF6-E29A4D94A127}"/>
               </a:ext>
             </a:extLst>
           </p:cNvPr>
@@ -2906,7 +2909,7 @@
           <p:cNvPr id="4" name="Marcador de fecha 3">
             <a:extLst>
               <a:ext uri="{FF2B5EF4-FFF2-40B4-BE49-F238E27FC236}">
-                <a16:creationId xmlns="" xmlns:a16="http://schemas.microsoft.com/office/drawing/2014/main" id="{F4C471B7-4FAB-4AE1-9911-90A6262EB7DB}"/>
+                <a16:creationId xmlns:a16="http://schemas.microsoft.com/office/drawing/2014/main" xmlns="" id="{F4C471B7-4FAB-4AE1-9911-90A6262EB7DB}"/>
               </a:ext>
             </a:extLst>
           </p:cNvPr>
@@ -2943,7 +2946,7 @@
             <a:fld id="{78764E5D-33CF-411D-8190-6505647B94A7}" type="datetimeFigureOut">
               <a:rPr lang="es-ES" smtClean="0"/>
               <a:pPr/>
-              <a:t>09/05/2020</a:t>
+              <a:t>10/05/2020</a:t>
             </a:fld>
             <a:endParaRPr lang="es-ES"/>
           </a:p>
@@ -2954,7 +2957,7 @@
           <p:cNvPr id="5" name="Marcador de pie de página 4">
             <a:extLst>
               <a:ext uri="{FF2B5EF4-FFF2-40B4-BE49-F238E27FC236}">
-                <a16:creationId xmlns="" xmlns:a16="http://schemas.microsoft.com/office/drawing/2014/main" id="{A045127F-9083-4BC1-9BF9-F57CA96172E2}"/>
+                <a16:creationId xmlns:a16="http://schemas.microsoft.com/office/drawing/2014/main" xmlns="" id="{A045127F-9083-4BC1-9BF9-F57CA96172E2}"/>
               </a:ext>
             </a:extLst>
           </p:cNvPr>
@@ -2997,7 +3000,7 @@
           <p:cNvPr id="6" name="Marcador de número de diapositiva 5">
             <a:extLst>
               <a:ext uri="{FF2B5EF4-FFF2-40B4-BE49-F238E27FC236}">
-                <a16:creationId xmlns="" xmlns:a16="http://schemas.microsoft.com/office/drawing/2014/main" id="{A1A48528-EDBD-42B1-84A5-57EA82B4B74E}"/>
+                <a16:creationId xmlns:a16="http://schemas.microsoft.com/office/drawing/2014/main" xmlns="" id="{A1A48528-EDBD-42B1-84A5-57EA82B4B74E}"/>
               </a:ext>
             </a:extLst>
           </p:cNvPr>
@@ -3043,7 +3046,7 @@
     </p:spTree>
     <p:extLst>
       <p:ext uri="{BB962C8B-B14F-4D97-AF65-F5344CB8AC3E}">
-        <p14:creationId xmlns="" xmlns:p14="http://schemas.microsoft.com/office/powerpoint/2010/main" val="1897558578"/>
+        <p14:creationId xmlns:p14="http://schemas.microsoft.com/office/powerpoint/2010/main" xmlns="" val="1897558578"/>
       </p:ext>
     </p:extLst>
   </p:cSld>
@@ -3366,7 +3369,7 @@
           <p:cNvPr id="3" name="Subtítulo 2">
             <a:extLst>
               <a:ext uri="{FF2B5EF4-FFF2-40B4-BE49-F238E27FC236}">
-                <a16:creationId xmlns="" xmlns:a16="http://schemas.microsoft.com/office/drawing/2014/main" id="{1D9CAFF8-79A5-4ED1-BACE-0542B577529D}"/>
+                <a16:creationId xmlns:a16="http://schemas.microsoft.com/office/drawing/2014/main" xmlns="" id="{1D9CAFF8-79A5-4ED1-BACE-0542B577529D}"/>
               </a:ext>
             </a:extLst>
           </p:cNvPr>
@@ -3391,225 +3394,244 @@
           <a:p>
             <a:pPr algn="l"/>
             <a:r>
-              <a:rPr lang="en-US" sz="2000" dirty="0" err="1"/>
+              <a:rPr lang="en-US" sz="1800" dirty="0" err="1"/>
               <a:t>Clase</a:t>
             </a:r>
             <a:r>
-              <a:rPr lang="en-US" sz="2000" dirty="0"/>
+              <a:rPr lang="en-US" sz="1800" dirty="0"/>
               <a:t> </a:t>
             </a:r>
             <a:r>
-              <a:rPr lang="en-US" sz="2000" dirty="0" err="1"/>
+              <a:rPr lang="en-US" sz="1800" dirty="0" err="1"/>
               <a:t>aparte</a:t>
             </a:r>
             <a:r>
-              <a:rPr lang="en-US" sz="2000" dirty="0"/>
+              <a:rPr lang="en-US" sz="1800" dirty="0"/>
               <a:t>?</a:t>
             </a:r>
             <a:br>
-              <a:rPr lang="en-US" sz="2000" dirty="0"/>
+              <a:rPr lang="en-US" sz="1800" dirty="0"/>
             </a:br>
             <a:r>
-              <a:rPr lang="en-US" sz="2000" dirty="0" err="1"/>
+              <a:rPr lang="en-US" sz="1800" dirty="0" err="1"/>
               <a:t>Varias</a:t>
             </a:r>
             <a:r>
-              <a:rPr lang="en-US" sz="2000" dirty="0"/>
+              <a:rPr lang="en-US" sz="1800" dirty="0"/>
               <a:t> walls</a:t>
             </a:r>
           </a:p>
           <a:p>
             <a:pPr algn="l"/>
             <a:r>
-              <a:rPr lang="en-US" sz="2000" dirty="0"/>
+              <a:rPr lang="en-US" sz="1800" dirty="0"/>
               <a:t>No </a:t>
             </a:r>
             <a:r>
-              <a:rPr lang="en-US" sz="2000" dirty="0" err="1"/>
+              <a:rPr lang="en-US" sz="1800" dirty="0" err="1"/>
               <a:t>puede</a:t>
             </a:r>
             <a:r>
-              <a:rPr lang="en-US" sz="2000" dirty="0"/>
+              <a:rPr lang="en-US" sz="1800" dirty="0"/>
               <a:t> ser de 1nm, es </a:t>
             </a:r>
             <a:r>
-              <a:rPr lang="en-US" sz="2000" dirty="0" err="1"/>
+              <a:rPr lang="en-US" sz="1800" dirty="0" err="1"/>
               <a:t>muy</a:t>
             </a:r>
             <a:r>
-              <a:rPr lang="en-US" sz="2000" dirty="0"/>
+              <a:rPr lang="en-US" sz="1800" dirty="0"/>
               <a:t> </a:t>
             </a:r>
             <a:r>
-              <a:rPr lang="en-US" sz="2000" dirty="0" err="1"/>
+              <a:rPr lang="en-US" sz="1800" dirty="0" err="1"/>
               <a:t>pequeño</a:t>
             </a:r>
             <a:r>
-              <a:rPr lang="en-US" sz="2000" dirty="0"/>
+              <a:rPr lang="en-US" sz="1800" dirty="0"/>
               <a:t>!!</a:t>
             </a:r>
           </a:p>
           <a:p>
             <a:pPr algn="l"/>
             <a:r>
-              <a:rPr lang="en-US" sz="2000" dirty="0" err="1"/>
+              <a:rPr lang="en-US" sz="1800" dirty="0" err="1"/>
               <a:t>Normalizar</a:t>
             </a:r>
             <a:r>
-              <a:rPr lang="en-US" sz="2000" dirty="0"/>
+              <a:rPr lang="en-US" sz="1800" dirty="0"/>
               <a:t> </a:t>
             </a:r>
             <a:r>
-              <a:rPr lang="en-US" sz="2000" dirty="0" err="1"/>
+              <a:rPr lang="en-US" sz="1800" dirty="0" err="1"/>
               <a:t>frec</a:t>
             </a:r>
             <a:r>
-              <a:rPr lang="en-US" sz="2000" dirty="0" smtClean="0"/>
+              <a:rPr lang="en-US" sz="1800" dirty="0" smtClean="0"/>
               <a:t>.</a:t>
             </a:r>
           </a:p>
           <a:p>
             <a:pPr algn="l"/>
             <a:r>
-              <a:rPr lang="en-US" sz="2000" dirty="0" err="1" smtClean="0"/>
+              <a:rPr lang="en-US" sz="1800" dirty="0" err="1" smtClean="0"/>
               <a:t>Funcion</a:t>
             </a:r>
             <a:r>
-              <a:rPr lang="en-US" sz="2000" dirty="0" smtClean="0"/>
+              <a:rPr lang="en-US" sz="1800" dirty="0" smtClean="0"/>
               <a:t> </a:t>
             </a:r>
             <a:r>
-              <a:rPr lang="en-US" sz="2000" dirty="0" err="1" smtClean="0"/>
+              <a:rPr lang="en-US" sz="1800" dirty="0" err="1" smtClean="0"/>
               <a:t>ComplexField</a:t>
             </a:r>
             <a:r>
-              <a:rPr lang="en-US" sz="2000" dirty="0" smtClean="0"/>
+              <a:rPr lang="en-US" sz="1800" dirty="0" smtClean="0"/>
               <a:t> en dispersive media??</a:t>
             </a:r>
           </a:p>
           <a:p>
             <a:pPr algn="l"/>
             <a:r>
-              <a:rPr lang="en-US" sz="2000" dirty="0" err="1" smtClean="0"/>
+              <a:rPr lang="en-US" sz="1800" dirty="0" err="1" smtClean="0"/>
               <a:t>Copy.deepcopy</a:t>
             </a:r>
             <a:r>
-              <a:rPr lang="en-US" sz="2000" dirty="0" smtClean="0"/>
+              <a:rPr lang="en-US" sz="1800" dirty="0" smtClean="0"/>
               <a:t> </a:t>
             </a:r>
             <a:r>
-              <a:rPr lang="en-US" sz="2000" dirty="0" err="1" smtClean="0"/>
+              <a:rPr lang="en-US" sz="1800" dirty="0" err="1" smtClean="0"/>
               <a:t>para</a:t>
             </a:r>
             <a:r>
-              <a:rPr lang="en-US" sz="2000" dirty="0" smtClean="0"/>
+              <a:rPr lang="en-US" sz="1800" dirty="0" smtClean="0"/>
               <a:t> no </a:t>
             </a:r>
             <a:r>
-              <a:rPr lang="en-US" sz="2000" dirty="0" err="1" smtClean="0"/>
+              <a:rPr lang="en-US" sz="1800" dirty="0" err="1" smtClean="0"/>
               <a:t>cargarte</a:t>
             </a:r>
             <a:r>
-              <a:rPr lang="en-US" sz="2000" dirty="0" smtClean="0"/>
+              <a:rPr lang="en-US" sz="1800" dirty="0" smtClean="0"/>
               <a:t> la </a:t>
             </a:r>
             <a:r>
-              <a:rPr lang="en-US" sz="2000" dirty="0" err="1" smtClean="0"/>
+              <a:rPr lang="en-US" sz="1800" dirty="0" err="1" smtClean="0"/>
               <a:t>clase</a:t>
             </a:r>
             <a:r>
-              <a:rPr lang="en-US" sz="2000" dirty="0" smtClean="0"/>
+              <a:rPr lang="en-US" sz="1800" dirty="0" smtClean="0"/>
               <a:t>?</a:t>
             </a:r>
           </a:p>
           <a:p>
             <a:pPr algn="l"/>
             <a:r>
-              <a:rPr lang="en-US" sz="2000" dirty="0" err="1" smtClean="0"/>
+              <a:rPr lang="en-US" sz="1800" dirty="0" err="1" smtClean="0"/>
               <a:t>Por</a:t>
             </a:r>
             <a:r>
-              <a:rPr lang="en-US" sz="2000" dirty="0" smtClean="0"/>
+              <a:rPr lang="en-US" sz="1800" dirty="0" smtClean="0"/>
               <a:t> q la </a:t>
             </a:r>
             <a:r>
-              <a:rPr lang="en-US" sz="2000" dirty="0" err="1" smtClean="0"/>
+              <a:rPr lang="en-US" sz="1800" dirty="0" err="1" smtClean="0"/>
               <a:t>funcion</a:t>
             </a:r>
             <a:r>
-              <a:rPr lang="en-US" sz="2000" dirty="0" smtClean="0"/>
+              <a:rPr lang="en-US" sz="1800" dirty="0" smtClean="0"/>
               <a:t> fields?</a:t>
             </a:r>
           </a:p>
           <a:p>
             <a:pPr algn="l"/>
             <a:r>
-              <a:rPr lang="en-US" sz="2000" dirty="0" smtClean="0"/>
+              <a:rPr lang="en-US" sz="1800" dirty="0" smtClean="0"/>
               <a:t>Linea solver </a:t>
             </a:r>
             <a:r>
-              <a:rPr lang="en-US" sz="2000" dirty="0" err="1" smtClean="0"/>
+              <a:rPr lang="en-US" sz="1800" dirty="0" err="1" smtClean="0"/>
               <a:t>debajo</a:t>
             </a:r>
             <a:r>
-              <a:rPr lang="en-US" sz="2000" dirty="0" smtClean="0"/>
+              <a:rPr lang="en-US" sz="1800" dirty="0" smtClean="0"/>
+              <a:t> for </a:t>
+            </a:r>
+            <a:r>
+              <a:rPr lang="en-US" sz="1800" dirty="0" err="1" smtClean="0"/>
+              <a:t>i</a:t>
+            </a:r>
+            <a:r>
+              <a:rPr lang="en-US" sz="1800" dirty="0" smtClean="0"/>
+              <a:t> in range(0,np.shape(</a:t>
+            </a:r>
+            <a:r>
+              <a:rPr lang="en-US" sz="1800" dirty="0" err="1" smtClean="0"/>
+              <a:t>Jp_old</a:t>
+            </a:r>
+            <a:r>
+              <a:rPr lang="en-US" sz="1800" dirty="0" smtClean="0"/>
+              <a:t>)[1]):</a:t>
+            </a:r>
+            <a:r>
+              <a:rPr lang="es-ES" sz="1800" dirty="0" smtClean="0"/>
+              <a:t> . No pongo 1:-1? Al </a:t>
+            </a:r>
+            <a:r>
+              <a:rPr lang="es-ES" sz="1800" dirty="0" err="1" smtClean="0"/>
+              <a:t>Jp</a:t>
+            </a:r>
+            <a:r>
+              <a:rPr lang="es-ES" sz="1800" dirty="0" smtClean="0"/>
+              <a:t>?</a:t>
+            </a:r>
+          </a:p>
+          <a:p>
+            <a:pPr algn="l"/>
+            <a:r>
+              <a:rPr lang="es-ES" sz="1800" dirty="0" err="1" smtClean="0"/>
+              <a:t>Indices</a:t>
+            </a:r>
+            <a:r>
+              <a:rPr lang="es-ES" sz="1800" dirty="0" smtClean="0"/>
+              <a:t> de h y e con cual corresponden?</a:t>
+            </a:r>
+          </a:p>
+          <a:p>
+            <a:pPr algn="l"/>
+            <a:r>
+              <a:rPr lang="es-ES" sz="1800" dirty="0" err="1" smtClean="0"/>
+              <a:t>fft.fftshift</a:t>
+            </a:r>
+            <a:r>
+              <a:rPr lang="en-US" sz="1800" dirty="0" smtClean="0"/>
+              <a:t>?</a:t>
+            </a:r>
+          </a:p>
+          <a:p>
+            <a:pPr algn="l"/>
+            <a:r>
+              <a:rPr lang="en-US" sz="1800" dirty="0" err="1" smtClean="0"/>
+              <a:t>Diferencia</a:t>
+            </a:r>
+            <a:r>
+              <a:rPr lang="en-US" sz="1800" dirty="0" smtClean="0"/>
               <a:t> </a:t>
             </a:r>
             <a:r>
-              <a:rPr lang="en-US" sz="900" dirty="0" smtClean="0"/>
-              <a:t>for </a:t>
-            </a:r>
-            <a:r>
-              <a:rPr lang="en-US" sz="900" dirty="0" err="1" smtClean="0"/>
-              <a:t>i</a:t>
-            </a:r>
-            <a:r>
-              <a:rPr lang="en-US" sz="900" dirty="0" smtClean="0"/>
-              <a:t> in range(0,np.shape(</a:t>
-            </a:r>
-            <a:r>
-              <a:rPr lang="en-US" sz="900" dirty="0" err="1" smtClean="0"/>
-              <a:t>Jp_old</a:t>
-            </a:r>
-            <a:r>
-              <a:rPr lang="en-US" sz="900" dirty="0" smtClean="0"/>
-              <a:t>)[1]):</a:t>
-            </a:r>
-            <a:r>
-              <a:rPr lang="es-ES" sz="2000" dirty="0" smtClean="0"/>
-              <a:t> . No pongo 1:-1? Al </a:t>
-            </a:r>
-            <a:r>
-              <a:rPr lang="es-ES" sz="2000" dirty="0" err="1" smtClean="0"/>
-              <a:t>Jp</a:t>
-            </a:r>
-            <a:r>
-              <a:rPr lang="es-ES" sz="2000" dirty="0" smtClean="0"/>
-              <a:t>?</a:t>
-            </a:r>
-          </a:p>
-          <a:p>
-            <a:pPr algn="l"/>
-            <a:r>
-              <a:rPr lang="es-ES" sz="2000" dirty="0" err="1" smtClean="0"/>
-              <a:t>Indices</a:t>
-            </a:r>
-            <a:r>
-              <a:rPr lang="es-ES" sz="2000" dirty="0" smtClean="0"/>
-              <a:t> de h y e con cual corresponden?</a:t>
-            </a:r>
-          </a:p>
-          <a:p>
-            <a:pPr algn="l"/>
-            <a:r>
-              <a:rPr lang="es-ES" sz="900" dirty="0" err="1" smtClean="0"/>
-              <a:t>fft.fftshift</a:t>
-            </a:r>
-            <a:r>
-              <a:rPr lang="en-US" sz="900" dirty="0" smtClean="0"/>
-              <a:t>?</a:t>
-            </a:r>
-            <a:endParaRPr lang="es-ES" sz="900" dirty="0" smtClean="0"/>
+              <a:rPr lang="en-US" sz="1800" dirty="0" err="1" smtClean="0"/>
+              <a:t>eps_inf</a:t>
+            </a:r>
+            <a:r>
+              <a:rPr lang="en-US" sz="1800" dirty="0" smtClean="0"/>
+              <a:t> y </a:t>
+            </a:r>
+            <a:r>
+              <a:rPr lang="en-US" sz="1800" dirty="0" err="1" smtClean="0"/>
+              <a:t>eps_r</a:t>
+            </a:r>
+            <a:endParaRPr lang="es-ES" sz="1800" dirty="0" smtClean="0"/>
           </a:p>
         </p:txBody>
       </p:sp>
@@ -3684,7 +3706,7 @@
           <p:cNvPr id="5" name="Subtítulo 2">
             <a:extLst>
               <a:ext uri="{FF2B5EF4-FFF2-40B4-BE49-F238E27FC236}">
-                <a16:creationId xmlns="" xmlns:a16="http://schemas.microsoft.com/office/drawing/2014/main" id="{1D9CAFF8-79A5-4ED1-BACE-0542B577529D}"/>
+                <a16:creationId xmlns:a16="http://schemas.microsoft.com/office/drawing/2014/main" xmlns="" id="{1D9CAFF8-79A5-4ED1-BACE-0542B577529D}"/>
               </a:ext>
             </a:extLst>
           </p:cNvPr>
@@ -3743,7 +3765,7 @@
             </a:r>
             <a:r>
               <a:rPr lang="en-US" sz="2000" dirty="0" smtClean="0"/>
-              <a:t>=cp=0</a:t>
+              <a:t>=cp=0,width =&gt;</a:t>
             </a:r>
             <a:endParaRPr kumimoji="0" lang="en-US" sz="2000" b="0" i="0" u="none" strike="noStrike" kern="1200" cap="none" spc="0" normalizeH="0" baseline="0" noProof="0" dirty="0" err="1" smtClean="0">
               <a:ln>
@@ -3767,7 +3789,7 @@
           <p:cNvPr id="6" name="Subtítulo 2">
             <a:extLst>
               <a:ext uri="{FF2B5EF4-FFF2-40B4-BE49-F238E27FC236}">
-                <a16:creationId xmlns="" xmlns:a16="http://schemas.microsoft.com/office/drawing/2014/main" id="{1D9CAFF8-79A5-4ED1-BACE-0542B577529D}"/>
+                <a16:creationId xmlns:a16="http://schemas.microsoft.com/office/drawing/2014/main" xmlns="" id="{1D9CAFF8-79A5-4ED1-BACE-0542B577529D}"/>
               </a:ext>
             </a:extLst>
           </p:cNvPr>
@@ -3845,12 +3867,791 @@
           </a:p>
         </p:txBody>
       </p:sp>
+      <p:pic>
+        <p:nvPicPr>
+          <p:cNvPr id="2" name="Picture 2"/>
+          <p:cNvPicPr>
+            <a:picLocks noChangeAspect="1" noChangeArrowheads="1"/>
+          </p:cNvPicPr>
+          <p:nvPr/>
+        </p:nvPicPr>
+        <p:blipFill>
+          <a:blip r:embed="rId4" cstate="print"/>
+          <a:srcRect/>
+          <a:stretch>
+            <a:fillRect/>
+          </a:stretch>
+        </p:blipFill>
+        <p:spPr bwMode="auto">
+          <a:xfrm>
+            <a:off x="9706960" y="0"/>
+            <a:ext cx="2485040" cy="1908899"/>
+          </a:xfrm>
+          <a:prstGeom prst="rect">
+            <a:avLst/>
+          </a:prstGeom>
+          <a:noFill/>
+          <a:ln w="9525">
+            <a:noFill/>
+            <a:miter lim="800000"/>
+            <a:headEnd/>
+            <a:tailEnd/>
+          </a:ln>
+          <a:effectLst/>
+        </p:spPr>
+      </p:pic>
+      <p:pic>
+        <p:nvPicPr>
+          <p:cNvPr id="4" name="Picture 3"/>
+          <p:cNvPicPr>
+            <a:picLocks noChangeAspect="1" noChangeArrowheads="1"/>
+          </p:cNvPicPr>
+          <p:nvPr/>
+        </p:nvPicPr>
+        <p:blipFill>
+          <a:blip r:embed="rId5" cstate="print"/>
+          <a:srcRect/>
+          <a:stretch>
+            <a:fillRect/>
+          </a:stretch>
+        </p:blipFill>
+        <p:spPr bwMode="auto">
+          <a:xfrm>
+            <a:off x="6821052" y="0"/>
+            <a:ext cx="2652265" cy="1986455"/>
+          </a:xfrm>
+          <a:prstGeom prst="rect">
+            <a:avLst/>
+          </a:prstGeom>
+          <a:noFill/>
+          <a:ln w="9525">
+            <a:noFill/>
+            <a:miter lim="800000"/>
+            <a:headEnd/>
+            <a:tailEnd/>
+          </a:ln>
+          <a:effectLst/>
+        </p:spPr>
+      </p:pic>
+      <p:pic>
+        <p:nvPicPr>
+          <p:cNvPr id="1028" name="Picture 4"/>
+          <p:cNvPicPr>
+            <a:picLocks noChangeAspect="1" noChangeArrowheads="1"/>
+          </p:cNvPicPr>
+          <p:nvPr/>
+        </p:nvPicPr>
+        <p:blipFill>
+          <a:blip r:embed="rId6" cstate="print"/>
+          <a:srcRect/>
+          <a:stretch>
+            <a:fillRect/>
+          </a:stretch>
+        </p:blipFill>
+        <p:spPr bwMode="auto">
+          <a:xfrm>
+            <a:off x="6961461" y="4004575"/>
+            <a:ext cx="2450553" cy="1907494"/>
+          </a:xfrm>
+          <a:prstGeom prst="rect">
+            <a:avLst/>
+          </a:prstGeom>
+          <a:noFill/>
+          <a:ln w="9525">
+            <a:noFill/>
+            <a:miter lim="800000"/>
+            <a:headEnd/>
+            <a:tailEnd/>
+          </a:ln>
+          <a:effectLst/>
+        </p:spPr>
+      </p:pic>
+      <p:sp>
+        <p:nvSpPr>
+          <p:cNvPr id="10" name="Subtítulo 2">
+            <a:extLst>
+              <a:ext uri="{FF2B5EF4-FFF2-40B4-BE49-F238E27FC236}">
+                <a16:creationId xmlns:a16="http://schemas.microsoft.com/office/drawing/2014/main" xmlns="" id="{1D9CAFF8-79A5-4ED1-BACE-0542B577529D}"/>
+              </a:ext>
+            </a:extLst>
+          </p:cNvPr>
+          <p:cNvSpPr txBox="1">
+            <a:spLocks/>
+          </p:cNvSpPr>
+          <p:nvPr/>
+        </p:nvSpPr>
+        <p:spPr>
+          <a:xfrm>
+            <a:off x="7065530" y="3548629"/>
+            <a:ext cx="2409645" cy="511835"/>
+          </a:xfrm>
+          <a:prstGeom prst="rect">
+            <a:avLst/>
+          </a:prstGeom>
+        </p:spPr>
+        <p:txBody>
+          <a:bodyPr vert="horz" lIns="91440" tIns="45720" rIns="91440" bIns="45720" rtlCol="0">
+            <a:normAutofit fontScale="62500" lnSpcReduction="20000"/>
+          </a:bodyPr>
+          <a:lstStyle/>
+          <a:p>
+            <a:pPr marL="0" marR="0" lvl="0" indent="0" algn="l" defTabSz="914400" rtl="0" eaLnBrk="1" fontAlgn="auto" latinLnBrk="0" hangingPunct="1">
+              <a:lnSpc>
+                <a:spcPct val="90000"/>
+              </a:lnSpc>
+              <a:spcBef>
+                <a:spcPts val="1000"/>
+              </a:spcBef>
+              <a:spcAft>
+                <a:spcPts val="0"/>
+              </a:spcAft>
+              <a:buClrTx/>
+              <a:buSzTx/>
+              <a:buFont typeface="Arial" panose="020B0604020202020204" pitchFamily="34" charset="0"/>
+              <a:buNone/>
+              <a:tabLst/>
+              <a:defRPr/>
+            </a:pPr>
+            <a:r>
+              <a:rPr lang="en-US" sz="2000" dirty="0" smtClean="0"/>
+              <a:t>My </a:t>
+            </a:r>
+            <a:r>
+              <a:rPr lang="en-US" sz="2000" dirty="0" smtClean="0"/>
+              <a:t>class analytic</a:t>
+            </a:r>
+            <a:r>
+              <a:rPr lang="en-US" sz="2000" dirty="0" smtClean="0"/>
+              <a:t> </a:t>
+            </a:r>
+            <a:r>
+              <a:rPr lang="en-US" sz="2000" dirty="0" smtClean="0"/>
+              <a:t>Ag</a:t>
+            </a:r>
+          </a:p>
+          <a:p>
+            <a:pPr marL="0" marR="0" lvl="0" indent="0" algn="l" defTabSz="914400" rtl="0" eaLnBrk="1" fontAlgn="auto" latinLnBrk="0" hangingPunct="1">
+              <a:lnSpc>
+                <a:spcPct val="90000"/>
+              </a:lnSpc>
+              <a:spcBef>
+                <a:spcPts val="1000"/>
+              </a:spcBef>
+              <a:spcAft>
+                <a:spcPts val="0"/>
+              </a:spcAft>
+              <a:buClrTx/>
+              <a:buSzTx/>
+              <a:buFont typeface="Arial" panose="020B0604020202020204" pitchFamily="34" charset="0"/>
+              <a:buNone/>
+              <a:tabLst/>
+              <a:defRPr/>
+            </a:pPr>
+            <a:r>
+              <a:rPr kumimoji="0" lang="en-US" sz="2000" b="0" i="0" u="none" strike="noStrike" kern="1200" cap="none" spc="0" normalizeH="0" baseline="0" noProof="0" dirty="0" smtClean="0">
+                <a:ln>
+                  <a:noFill/>
+                </a:ln>
+                <a:solidFill>
+                  <a:schemeClr val="tx1"/>
+                </a:solidFill>
+                <a:effectLst/>
+                <a:uLnTx/>
+                <a:uFillTx/>
+                <a:latin typeface="+mn-lt"/>
+                <a:ea typeface="+mn-ea"/>
+                <a:cs typeface="+mn-cs"/>
+              </a:rPr>
+              <a:t>100 nm</a:t>
+            </a:r>
+            <a:endParaRPr kumimoji="0" lang="en-US" sz="2000" b="0" i="0" u="none" strike="noStrike" kern="1200" cap="none" spc="0" normalizeH="0" baseline="0" noProof="0" dirty="0" smtClean="0">
+              <a:ln>
+                <a:noFill/>
+              </a:ln>
+              <a:solidFill>
+                <a:schemeClr val="tx1"/>
+              </a:solidFill>
+              <a:effectLst/>
+              <a:uLnTx/>
+              <a:uFillTx/>
+              <a:latin typeface="+mn-lt"/>
+              <a:ea typeface="+mn-ea"/>
+              <a:cs typeface="+mn-cs"/>
+            </a:endParaRPr>
+          </a:p>
+        </p:txBody>
+      </p:sp>
+      <p:pic>
+        <p:nvPicPr>
+          <p:cNvPr id="1029" name="Picture 5"/>
+          <p:cNvPicPr>
+            <a:picLocks noChangeAspect="1" noChangeArrowheads="1"/>
+          </p:cNvPicPr>
+          <p:nvPr/>
+        </p:nvPicPr>
+        <p:blipFill>
+          <a:blip r:embed="rId7" cstate="print"/>
+          <a:srcRect/>
+          <a:stretch>
+            <a:fillRect/>
+          </a:stretch>
+        </p:blipFill>
+        <p:spPr bwMode="auto">
+          <a:xfrm>
+            <a:off x="4538576" y="3973484"/>
+            <a:ext cx="2438705" cy="1932623"/>
+          </a:xfrm>
+          <a:prstGeom prst="rect">
+            <a:avLst/>
+          </a:prstGeom>
+          <a:noFill/>
+          <a:ln w="9525">
+            <a:noFill/>
+            <a:miter lim="800000"/>
+            <a:headEnd/>
+            <a:tailEnd/>
+          </a:ln>
+          <a:effectLst/>
+        </p:spPr>
+      </p:pic>
+      <p:sp>
+        <p:nvSpPr>
+          <p:cNvPr id="13" name="Subtítulo 2">
+            <a:extLst>
+              <a:ext uri="{FF2B5EF4-FFF2-40B4-BE49-F238E27FC236}">
+                <a16:creationId xmlns:a16="http://schemas.microsoft.com/office/drawing/2014/main" xmlns="" id="{1D9CAFF8-79A5-4ED1-BACE-0542B577529D}"/>
+              </a:ext>
+            </a:extLst>
+          </p:cNvPr>
+          <p:cNvSpPr txBox="1">
+            <a:spLocks/>
+          </p:cNvSpPr>
+          <p:nvPr/>
+        </p:nvSpPr>
+        <p:spPr>
+          <a:xfrm>
+            <a:off x="4591108" y="3501524"/>
+            <a:ext cx="2409645" cy="511835"/>
+          </a:xfrm>
+          <a:prstGeom prst="rect">
+            <a:avLst/>
+          </a:prstGeom>
+        </p:spPr>
+        <p:txBody>
+          <a:bodyPr vert="horz" lIns="91440" tIns="45720" rIns="91440" bIns="45720" rtlCol="0">
+            <a:normAutofit/>
+          </a:bodyPr>
+          <a:lstStyle/>
+          <a:p>
+            <a:pPr marL="0" marR="0" lvl="0" indent="0" algn="l" defTabSz="914400" rtl="0" eaLnBrk="1" fontAlgn="auto" latinLnBrk="0" hangingPunct="1">
+              <a:lnSpc>
+                <a:spcPct val="90000"/>
+              </a:lnSpc>
+              <a:spcBef>
+                <a:spcPts val="1000"/>
+              </a:spcBef>
+              <a:spcAft>
+                <a:spcPts val="0"/>
+              </a:spcAft>
+              <a:buClrTx/>
+              <a:buSzTx/>
+              <a:buFont typeface="Arial" panose="020B0604020202020204" pitchFamily="34" charset="0"/>
+              <a:buNone/>
+              <a:tabLst/>
+              <a:defRPr/>
+            </a:pPr>
+            <a:r>
+              <a:rPr lang="en-US" sz="2000" dirty="0" smtClean="0"/>
+              <a:t>Numerical Ag 1nm</a:t>
+            </a:r>
+            <a:endParaRPr kumimoji="0" lang="en-US" sz="2000" b="0" i="0" u="none" strike="noStrike" kern="1200" cap="none" spc="0" normalizeH="0" baseline="0" noProof="0" dirty="0" err="1" smtClean="0">
+              <a:ln>
+                <a:noFill/>
+              </a:ln>
+              <a:solidFill>
+                <a:schemeClr val="tx1"/>
+              </a:solidFill>
+              <a:effectLst/>
+              <a:uLnTx/>
+              <a:uFillTx/>
+              <a:latin typeface="+mn-lt"/>
+              <a:ea typeface="+mn-ea"/>
+              <a:cs typeface="+mn-cs"/>
+            </a:endParaRPr>
+          </a:p>
+        </p:txBody>
+      </p:sp>
+      <p:pic>
+        <p:nvPicPr>
+          <p:cNvPr id="1031" name="Picture 7"/>
+          <p:cNvPicPr>
+            <a:picLocks noChangeAspect="1" noChangeArrowheads="1"/>
+          </p:cNvPicPr>
+          <p:nvPr/>
+        </p:nvPicPr>
+        <p:blipFill>
+          <a:blip r:embed="rId8" cstate="print"/>
+          <a:srcRect/>
+          <a:stretch>
+            <a:fillRect/>
+          </a:stretch>
+        </p:blipFill>
+        <p:spPr bwMode="auto">
+          <a:xfrm>
+            <a:off x="9367927" y="3961592"/>
+            <a:ext cx="2668823" cy="1964755"/>
+          </a:xfrm>
+          <a:prstGeom prst="rect">
+            <a:avLst/>
+          </a:prstGeom>
+          <a:noFill/>
+          <a:ln w="9525">
+            <a:noFill/>
+            <a:miter lim="800000"/>
+            <a:headEnd/>
+            <a:tailEnd/>
+          </a:ln>
+          <a:effectLst/>
+        </p:spPr>
+      </p:pic>
+      <p:sp>
+        <p:nvSpPr>
+          <p:cNvPr id="15" name="Subtítulo 2">
+            <a:extLst>
+              <a:ext uri="{FF2B5EF4-FFF2-40B4-BE49-F238E27FC236}">
+                <a16:creationId xmlns:a16="http://schemas.microsoft.com/office/drawing/2014/main" xmlns="" id="{1D9CAFF8-79A5-4ED1-BACE-0542B577529D}"/>
+              </a:ext>
+            </a:extLst>
+          </p:cNvPr>
+          <p:cNvSpPr txBox="1">
+            <a:spLocks/>
+          </p:cNvSpPr>
+          <p:nvPr/>
+        </p:nvSpPr>
+        <p:spPr>
+          <a:xfrm>
+            <a:off x="9782355" y="3390478"/>
+            <a:ext cx="2409645" cy="511835"/>
+          </a:xfrm>
+          <a:prstGeom prst="rect">
+            <a:avLst/>
+          </a:prstGeom>
+        </p:spPr>
+        <p:txBody>
+          <a:bodyPr vert="horz" lIns="91440" tIns="45720" rIns="91440" bIns="45720" rtlCol="0">
+            <a:normAutofit fontScale="62500" lnSpcReduction="20000"/>
+          </a:bodyPr>
+          <a:lstStyle/>
+          <a:p>
+            <a:pPr marL="0" marR="0" lvl="0" indent="0" algn="l" defTabSz="914400" rtl="0" eaLnBrk="1" fontAlgn="auto" latinLnBrk="0" hangingPunct="1">
+              <a:lnSpc>
+                <a:spcPct val="90000"/>
+              </a:lnSpc>
+              <a:spcBef>
+                <a:spcPts val="1000"/>
+              </a:spcBef>
+              <a:spcAft>
+                <a:spcPts val="0"/>
+              </a:spcAft>
+              <a:buClrTx/>
+              <a:buSzTx/>
+              <a:buFont typeface="Arial" panose="020B0604020202020204" pitchFamily="34" charset="0"/>
+              <a:buNone/>
+              <a:tabLst/>
+              <a:defRPr/>
+            </a:pPr>
+            <a:r>
+              <a:rPr lang="en-US" sz="2000" dirty="0" smtClean="0"/>
+              <a:t>My </a:t>
+            </a:r>
+            <a:r>
+              <a:rPr lang="en-US" sz="2000" dirty="0" smtClean="0"/>
+              <a:t>class analytic</a:t>
+            </a:r>
+            <a:r>
+              <a:rPr lang="en-US" sz="2000" dirty="0" smtClean="0"/>
+              <a:t> </a:t>
+            </a:r>
+            <a:r>
+              <a:rPr lang="en-US" sz="2000" dirty="0" smtClean="0"/>
+              <a:t>Ag</a:t>
+            </a:r>
+          </a:p>
+          <a:p>
+            <a:pPr marL="0" marR="0" lvl="0" indent="0" algn="l" defTabSz="914400" rtl="0" eaLnBrk="1" fontAlgn="auto" latinLnBrk="0" hangingPunct="1">
+              <a:lnSpc>
+                <a:spcPct val="90000"/>
+              </a:lnSpc>
+              <a:spcBef>
+                <a:spcPts val="1000"/>
+              </a:spcBef>
+              <a:spcAft>
+                <a:spcPts val="0"/>
+              </a:spcAft>
+              <a:buClrTx/>
+              <a:buSzTx/>
+              <a:buFont typeface="Arial" panose="020B0604020202020204" pitchFamily="34" charset="0"/>
+              <a:buNone/>
+              <a:tabLst/>
+              <a:defRPr/>
+            </a:pPr>
+            <a:r>
+              <a:rPr kumimoji="0" lang="en-US" sz="2000" b="0" i="0" u="none" strike="noStrike" kern="1200" cap="none" spc="0" normalizeH="0" baseline="0" noProof="0" dirty="0" smtClean="0">
+                <a:ln>
+                  <a:noFill/>
+                </a:ln>
+                <a:solidFill>
+                  <a:schemeClr val="tx1"/>
+                </a:solidFill>
+                <a:effectLst/>
+                <a:uLnTx/>
+                <a:uFillTx/>
+                <a:latin typeface="+mn-lt"/>
+                <a:ea typeface="+mn-ea"/>
+                <a:cs typeface="+mn-cs"/>
+              </a:rPr>
+              <a:t>1 nm</a:t>
+            </a:r>
+            <a:endParaRPr kumimoji="0" lang="en-US" sz="2000" b="0" i="0" u="none" strike="noStrike" kern="1200" cap="none" spc="0" normalizeH="0" baseline="0" noProof="0" dirty="0" smtClean="0">
+              <a:ln>
+                <a:noFill/>
+              </a:ln>
+              <a:solidFill>
+                <a:schemeClr val="tx1"/>
+              </a:solidFill>
+              <a:effectLst/>
+              <a:uLnTx/>
+              <a:uFillTx/>
+              <a:latin typeface="+mn-lt"/>
+              <a:ea typeface="+mn-ea"/>
+              <a:cs typeface="+mn-cs"/>
+            </a:endParaRPr>
+          </a:p>
+        </p:txBody>
+      </p:sp>
     </p:spTree>
     <p:extLst>
       <p:ext uri="{BB962C8B-B14F-4D97-AF65-F5344CB8AC3E}">
-        <p14:creationId xmlns="" xmlns:p14="http://schemas.microsoft.com/office/powerpoint/2010/main" val="1745674762"/>
+        <p14:creationId xmlns:p14="http://schemas.microsoft.com/office/powerpoint/2010/main" xmlns="" val="1745674762"/>
       </p:ext>
     </p:extLst>
+  </p:cSld>
+  <p:clrMapOvr>
+    <a:masterClrMapping/>
+  </p:clrMapOvr>
+</p:sld>
+</file>
+
+<file path=ppt/slides/slide2.xml><?xml version="1.0" encoding="utf-8"?>
+<p:sld xmlns:a="http://schemas.openxmlformats.org/drawingml/2006/main" xmlns:r="http://schemas.openxmlformats.org/officeDocument/2006/relationships" xmlns:p="http://schemas.openxmlformats.org/presentationml/2006/main">
+  <p:cSld>
+    <p:spTree>
+      <p:nvGrpSpPr>
+        <p:cNvPr id="1" name=""/>
+        <p:cNvGrpSpPr/>
+        <p:nvPr/>
+      </p:nvGrpSpPr>
+      <p:grpSpPr>
+        <a:xfrm>
+          <a:off x="0" y="0"/>
+          <a:ext cx="0" cy="0"/>
+          <a:chOff x="0" y="0"/>
+          <a:chExt cx="0" cy="0"/>
+        </a:xfrm>
+      </p:grpSpPr>
+      <p:sp>
+        <p:nvSpPr>
+          <p:cNvPr id="2" name="1 Título"/>
+          <p:cNvSpPr>
+            <a:spLocks noGrp="1"/>
+          </p:cNvSpPr>
+          <p:nvPr>
+            <p:ph type="title"/>
+          </p:nvPr>
+        </p:nvSpPr>
+        <p:spPr/>
+        <p:txBody>
+          <a:bodyPr/>
+          <a:lstStyle/>
+          <a:p>
+            <a:endParaRPr lang="es-ES"/>
+          </a:p>
+        </p:txBody>
+      </p:sp>
+      <p:sp>
+        <p:nvSpPr>
+          <p:cNvPr id="3" name="2 Marcador de contenido"/>
+          <p:cNvSpPr>
+            <a:spLocks noGrp="1"/>
+          </p:cNvSpPr>
+          <p:nvPr>
+            <p:ph idx="1"/>
+          </p:nvPr>
+        </p:nvSpPr>
+        <p:spPr/>
+        <p:txBody>
+          <a:bodyPr/>
+          <a:lstStyle/>
+          <a:p>
+            <a:endParaRPr lang="es-ES"/>
+          </a:p>
+        </p:txBody>
+      </p:sp>
+    </p:spTree>
+  </p:cSld>
+  <p:clrMapOvr>
+    <a:masterClrMapping/>
+  </p:clrMapOvr>
+</p:sld>
+</file>
+
+<file path=ppt/slides/slide3.xml><?xml version="1.0" encoding="utf-8"?>
+<p:sld xmlns:a="http://schemas.openxmlformats.org/drawingml/2006/main" xmlns:r="http://schemas.openxmlformats.org/officeDocument/2006/relationships" xmlns:p="http://schemas.openxmlformats.org/presentationml/2006/main">
+  <p:cSld>
+    <p:spTree>
+      <p:nvGrpSpPr>
+        <p:cNvPr id="1" name=""/>
+        <p:cNvGrpSpPr/>
+        <p:nvPr/>
+      </p:nvGrpSpPr>
+      <p:grpSpPr>
+        <a:xfrm>
+          <a:off x="0" y="0"/>
+          <a:ext cx="0" cy="0"/>
+          <a:chOff x="0" y="0"/>
+          <a:chExt cx="0" cy="0"/>
+        </a:xfrm>
+      </p:grpSpPr>
+      <p:sp>
+        <p:nvSpPr>
+          <p:cNvPr id="2" name="1 Título"/>
+          <p:cNvSpPr>
+            <a:spLocks noGrp="1"/>
+          </p:cNvSpPr>
+          <p:nvPr>
+            <p:ph type="title"/>
+          </p:nvPr>
+        </p:nvSpPr>
+        <p:spPr/>
+        <p:txBody>
+          <a:bodyPr/>
+          <a:lstStyle/>
+          <a:p>
+            <a:endParaRPr lang="es-ES"/>
+          </a:p>
+        </p:txBody>
+      </p:sp>
+      <p:sp>
+        <p:nvSpPr>
+          <p:cNvPr id="3" name="2 Marcador de contenido"/>
+          <p:cNvSpPr>
+            <a:spLocks noGrp="1"/>
+          </p:cNvSpPr>
+          <p:nvPr>
+            <p:ph idx="1"/>
+          </p:nvPr>
+        </p:nvSpPr>
+        <p:spPr/>
+        <p:txBody>
+          <a:bodyPr/>
+          <a:lstStyle/>
+          <a:p>
+            <a:endParaRPr lang="es-ES"/>
+          </a:p>
+        </p:txBody>
+      </p:sp>
+    </p:spTree>
+  </p:cSld>
+  <p:clrMapOvr>
+    <a:masterClrMapping/>
+  </p:clrMapOvr>
+</p:sld>
+</file>
+
+<file path=ppt/slides/slide4.xml><?xml version="1.0" encoding="utf-8"?>
+<p:sld xmlns:a="http://schemas.openxmlformats.org/drawingml/2006/main" xmlns:r="http://schemas.openxmlformats.org/officeDocument/2006/relationships" xmlns:p="http://schemas.openxmlformats.org/presentationml/2006/main">
+  <p:cSld>
+    <p:spTree>
+      <p:nvGrpSpPr>
+        <p:cNvPr id="1" name=""/>
+        <p:cNvGrpSpPr/>
+        <p:nvPr/>
+      </p:nvGrpSpPr>
+      <p:grpSpPr>
+        <a:xfrm>
+          <a:off x="0" y="0"/>
+          <a:ext cx="0" cy="0"/>
+          <a:chOff x="0" y="0"/>
+          <a:chExt cx="0" cy="0"/>
+        </a:xfrm>
+      </p:grpSpPr>
+      <p:sp>
+        <p:nvSpPr>
+          <p:cNvPr id="2" name="1 Título"/>
+          <p:cNvSpPr>
+            <a:spLocks noGrp="1"/>
+          </p:cNvSpPr>
+          <p:nvPr>
+            <p:ph type="title"/>
+          </p:nvPr>
+        </p:nvSpPr>
+        <p:spPr/>
+        <p:txBody>
+          <a:bodyPr/>
+          <a:lstStyle/>
+          <a:p>
+            <a:r>
+              <a:rPr lang="en-US" dirty="0" smtClean="0"/>
+              <a:t>FDTD in dispersive media:</a:t>
+            </a:r>
+            <a:endParaRPr lang="es-ES" dirty="0"/>
+          </a:p>
+        </p:txBody>
+      </p:sp>
+      <p:pic>
+        <p:nvPicPr>
+          <p:cNvPr id="2050" name="Picture 2"/>
+          <p:cNvPicPr>
+            <a:picLocks noChangeAspect="1" noChangeArrowheads="1"/>
+          </p:cNvPicPr>
+          <p:nvPr/>
+        </p:nvPicPr>
+        <p:blipFill>
+          <a:blip r:embed="rId2"/>
+          <a:srcRect/>
+          <a:stretch>
+            <a:fillRect/>
+          </a:stretch>
+        </p:blipFill>
+        <p:spPr bwMode="auto">
+          <a:xfrm>
+            <a:off x="1026542" y="2378375"/>
+            <a:ext cx="6226295" cy="936435"/>
+          </a:xfrm>
+          <a:prstGeom prst="rect">
+            <a:avLst/>
+          </a:prstGeom>
+          <a:noFill/>
+          <a:ln w="9525">
+            <a:noFill/>
+            <a:miter lim="800000"/>
+            <a:headEnd/>
+            <a:tailEnd/>
+          </a:ln>
+          <a:effectLst/>
+        </p:spPr>
+      </p:pic>
+      <p:pic>
+        <p:nvPicPr>
+          <p:cNvPr id="2051" name="Picture 3"/>
+          <p:cNvPicPr>
+            <a:picLocks noChangeAspect="1" noChangeArrowheads="1"/>
+          </p:cNvPicPr>
+          <p:nvPr/>
+        </p:nvPicPr>
+        <p:blipFill>
+          <a:blip r:embed="rId3"/>
+          <a:srcRect/>
+          <a:stretch>
+            <a:fillRect/>
+          </a:stretch>
+        </p:blipFill>
+        <p:spPr bwMode="auto">
+          <a:xfrm>
+            <a:off x="966159" y="4815247"/>
+            <a:ext cx="6313188" cy="1436047"/>
+          </a:xfrm>
+          <a:prstGeom prst="rect">
+            <a:avLst/>
+          </a:prstGeom>
+          <a:noFill/>
+          <a:ln w="9525">
+            <a:noFill/>
+            <a:miter lim="800000"/>
+            <a:headEnd/>
+            <a:tailEnd/>
+          </a:ln>
+          <a:effectLst/>
+        </p:spPr>
+      </p:pic>
+      <p:pic>
+        <p:nvPicPr>
+          <p:cNvPr id="2052" name="Picture 4"/>
+          <p:cNvPicPr>
+            <a:picLocks noChangeAspect="1" noChangeArrowheads="1"/>
+          </p:cNvPicPr>
+          <p:nvPr/>
+        </p:nvPicPr>
+        <p:blipFill>
+          <a:blip r:embed="rId4"/>
+          <a:srcRect/>
+          <a:stretch>
+            <a:fillRect/>
+          </a:stretch>
+        </p:blipFill>
+        <p:spPr bwMode="auto">
+          <a:xfrm>
+            <a:off x="664233" y="3556871"/>
+            <a:ext cx="6157913" cy="1001088"/>
+          </a:xfrm>
+          <a:prstGeom prst="rect">
+            <a:avLst/>
+          </a:prstGeom>
+          <a:noFill/>
+          <a:ln w="9525">
+            <a:noFill/>
+            <a:miter lim="800000"/>
+            <a:headEnd/>
+            <a:tailEnd/>
+          </a:ln>
+          <a:effectLst/>
+        </p:spPr>
+      </p:pic>
+      <p:pic>
+        <p:nvPicPr>
+          <p:cNvPr id="2053" name="Picture 5"/>
+          <p:cNvPicPr>
+            <a:picLocks noChangeAspect="1" noChangeArrowheads="1"/>
+          </p:cNvPicPr>
+          <p:nvPr/>
+        </p:nvPicPr>
+        <p:blipFill>
+          <a:blip r:embed="rId5">
+            <a:clrChange>
+              <a:clrFrom>
+                <a:srgbClr val="FFFFFF"/>
+              </a:clrFrom>
+              <a:clrTo>
+                <a:srgbClr val="FFFFFF">
+                  <a:alpha val="0"/>
+                </a:srgbClr>
+              </a:clrTo>
+            </a:clrChange>
+          </a:blip>
+          <a:srcRect/>
+          <a:stretch>
+            <a:fillRect/>
+          </a:stretch>
+        </p:blipFill>
+        <p:spPr bwMode="auto">
+          <a:xfrm>
+            <a:off x="6694085" y="3465394"/>
+            <a:ext cx="5247375" cy="1061969"/>
+          </a:xfrm>
+          <a:prstGeom prst="rect">
+            <a:avLst/>
+          </a:prstGeom>
+          <a:noFill/>
+          <a:ln w="9525">
+            <a:noFill/>
+            <a:miter lim="800000"/>
+            <a:headEnd/>
+            <a:tailEnd/>
+          </a:ln>
+          <a:effectLst/>
+        </p:spPr>
+      </p:pic>
+    </p:spTree>
   </p:cSld>
   <p:clrMapOvr>
     <a:masterClrMapping/>
@@ -4147,7 +4948,7 @@
   <a:extraClrSchemeLst/>
   <a:extLst>
     <a:ext uri="{05A4C25C-085E-4340-85A3-A5531E510DB2}">
-      <thm15:themeFamily xmlns="" xmlns:thm15="http://schemas.microsoft.com/office/thememl/2012/main" name="Office Theme" id="{62F939B6-93AF-4DB8-9C6B-D6C7DFDC589F}" vid="{4A3C46E8-61CC-4603-A589-7422A47A8E4A}"/>
+      <thm15:themeFamily xmlns:thm15="http://schemas.microsoft.com/office/thememl/2012/main" xmlns="" name="Office Theme" id="{62F939B6-93AF-4DB8-9C6B-D6C7DFDC589F}" vid="{4A3C46E8-61CC-4603-A589-7422A47A8E4A}"/>
     </a:ext>
   </a:extLst>
 </a:theme>

</xml_diff>